<commit_message>
Fixed tab change and added regions on some fragments
</commit_message>
<xml_diff>
--- a/Reports/Apresentação Progresso.pptx
+++ b/Reports/Apresentação Progresso.pptx
@@ -171,7 +171,7 @@
           <a:noFill/>
           <a:extLst>
             <a:ext uri="{909E8E84-426E-40dd-AFC4-6F175D3DCCD1}">
-              <a14:hiddenFill xmlns="" xmlns:a14="http://schemas.microsoft.com/office/drawing/2010/main">
+              <a14:hiddenFill xmlns:a14="http://schemas.microsoft.com/office/drawing/2010/main" xmlns="">
                 <a:solidFill>
                   <a:srgbClr val="FFFFFF"/>
                 </a:solidFill>
@@ -231,7 +231,7 @@
             </a:ln>
             <a:extLst>
               <a:ext uri="{91240B29-F687-4f45-9708-019B960494DF}">
-                <a14:hiddenLine xmlns="" xmlns:a14="http://schemas.microsoft.com/office/drawing/2010/main" w="9525">
+                <a14:hiddenLine xmlns:a14="http://schemas.microsoft.com/office/drawing/2010/main" xmlns="" w="9525">
                   <a:solidFill>
                     <a:srgbClr val="000000"/>
                   </a:solidFill>
@@ -321,7 +321,7 @@
             </a:ln>
             <a:extLst>
               <a:ext uri="{91240B29-F687-4f45-9708-019B960494DF}">
-                <a14:hiddenLine xmlns="" xmlns:a14="http://schemas.microsoft.com/office/drawing/2010/main" w="9525">
+                <a14:hiddenLine xmlns:a14="http://schemas.microsoft.com/office/drawing/2010/main" xmlns="" w="9525">
                   <a:solidFill>
                     <a:srgbClr val="000000"/>
                   </a:solidFill>
@@ -411,7 +411,7 @@
             </a:ln>
             <a:extLst>
               <a:ext uri="{91240B29-F687-4f45-9708-019B960494DF}">
-                <a14:hiddenLine xmlns="" xmlns:a14="http://schemas.microsoft.com/office/drawing/2010/main" w="9525">
+                <a14:hiddenLine xmlns:a14="http://schemas.microsoft.com/office/drawing/2010/main" xmlns="" w="9525">
                   <a:solidFill>
                     <a:srgbClr val="000000"/>
                   </a:solidFill>
@@ -445,7 +445,7 @@
             </a:ln>
             <a:extLst>
               <a:ext uri="{91240B29-F687-4f45-9708-019B960494DF}">
-                <a14:hiddenLine xmlns="" xmlns:a14="http://schemas.microsoft.com/office/drawing/2010/main" w="9525">
+                <a14:hiddenLine xmlns:a14="http://schemas.microsoft.com/office/drawing/2010/main" xmlns="" w="9525">
                   <a:solidFill>
                     <a:srgbClr val="000000"/>
                   </a:solidFill>
@@ -535,7 +535,7 @@
             </a:ln>
             <a:extLst>
               <a:ext uri="{91240B29-F687-4f45-9708-019B960494DF}">
-                <a14:hiddenLine xmlns="" xmlns:a14="http://schemas.microsoft.com/office/drawing/2010/main" w="9525">
+                <a14:hiddenLine xmlns:a14="http://schemas.microsoft.com/office/drawing/2010/main" xmlns="" w="9525">
                   <a:solidFill>
                     <a:srgbClr val="000000"/>
                   </a:solidFill>
@@ -597,7 +597,7 @@
             </a:ln>
             <a:extLst>
               <a:ext uri="{91240B29-F687-4f45-9708-019B960494DF}">
-                <a14:hiddenLine xmlns="" xmlns:a14="http://schemas.microsoft.com/office/drawing/2010/main" w="9525">
+                <a14:hiddenLine xmlns:a14="http://schemas.microsoft.com/office/drawing/2010/main" xmlns="" w="9525">
                   <a:solidFill>
                     <a:srgbClr val="000000"/>
                   </a:solidFill>
@@ -659,7 +659,7 @@
             </a:ln>
             <a:extLst>
               <a:ext uri="{91240B29-F687-4f45-9708-019B960494DF}">
-                <a14:hiddenLine xmlns="" xmlns:a14="http://schemas.microsoft.com/office/drawing/2010/main" w="9525">
+                <a14:hiddenLine xmlns:a14="http://schemas.microsoft.com/office/drawing/2010/main" xmlns="" w="9525">
                   <a:solidFill>
                     <a:srgbClr val="000000"/>
                   </a:solidFill>
@@ -749,7 +749,7 @@
             </a:ln>
             <a:extLst>
               <a:ext uri="{91240B29-F687-4f45-9708-019B960494DF}">
-                <a14:hiddenLine xmlns="" xmlns:a14="http://schemas.microsoft.com/office/drawing/2010/main" w="9525">
+                <a14:hiddenLine xmlns:a14="http://schemas.microsoft.com/office/drawing/2010/main" xmlns="" w="9525">
                   <a:solidFill>
                     <a:srgbClr val="000000"/>
                   </a:solidFill>
@@ -811,7 +811,7 @@
             </a:ln>
             <a:extLst>
               <a:ext uri="{91240B29-F687-4f45-9708-019B960494DF}">
-                <a14:hiddenLine xmlns="" xmlns:a14="http://schemas.microsoft.com/office/drawing/2010/main" w="9525">
+                <a14:hiddenLine xmlns:a14="http://schemas.microsoft.com/office/drawing/2010/main" xmlns="" w="9525">
                   <a:solidFill>
                     <a:srgbClr val="000000"/>
                   </a:solidFill>
@@ -873,7 +873,7 @@
             </a:ln>
             <a:extLst>
               <a:ext uri="{91240B29-F687-4f45-9708-019B960494DF}">
-                <a14:hiddenLine xmlns="" xmlns:a14="http://schemas.microsoft.com/office/drawing/2010/main" w="9525">
+                <a14:hiddenLine xmlns:a14="http://schemas.microsoft.com/office/drawing/2010/main" xmlns="" w="9525">
                   <a:solidFill>
                     <a:srgbClr val="000000"/>
                   </a:solidFill>
@@ -963,7 +963,7 @@
             </a:ln>
             <a:extLst>
               <a:ext uri="{91240B29-F687-4f45-9708-019B960494DF}">
-                <a14:hiddenLine xmlns="" xmlns:a14="http://schemas.microsoft.com/office/drawing/2010/main" w="9525">
+                <a14:hiddenLine xmlns:a14="http://schemas.microsoft.com/office/drawing/2010/main" xmlns="" w="9525">
                   <a:solidFill>
                     <a:srgbClr val="000000"/>
                   </a:solidFill>
@@ -1053,7 +1053,7 @@
             </a:ln>
             <a:extLst>
               <a:ext uri="{91240B29-F687-4f45-9708-019B960494DF}">
-                <a14:hiddenLine xmlns="" xmlns:a14="http://schemas.microsoft.com/office/drawing/2010/main" w="9525">
+                <a14:hiddenLine xmlns:a14="http://schemas.microsoft.com/office/drawing/2010/main" xmlns="" w="9525">
                   <a:solidFill>
                     <a:srgbClr val="000000"/>
                   </a:solidFill>
@@ -1115,7 +1115,7 @@
             </a:ln>
             <a:extLst>
               <a:ext uri="{91240B29-F687-4f45-9708-019B960494DF}">
-                <a14:hiddenLine xmlns="" xmlns:a14="http://schemas.microsoft.com/office/drawing/2010/main" w="9525">
+                <a14:hiddenLine xmlns:a14="http://schemas.microsoft.com/office/drawing/2010/main" xmlns="" w="9525">
                   <a:solidFill>
                     <a:srgbClr val="000000"/>
                   </a:solidFill>
@@ -1225,7 +1225,7 @@
             </a:ln>
             <a:extLst>
               <a:ext uri="{91240B29-F687-4f45-9708-019B960494DF}">
-                <a14:hiddenLine xmlns="" xmlns:a14="http://schemas.microsoft.com/office/drawing/2010/main" w="9525">
+                <a14:hiddenLine xmlns:a14="http://schemas.microsoft.com/office/drawing/2010/main" xmlns="" w="9525">
                   <a:solidFill>
                     <a:srgbClr val="000000"/>
                   </a:solidFill>
@@ -1287,7 +1287,7 @@
             </a:ln>
             <a:extLst>
               <a:ext uri="{91240B29-F687-4f45-9708-019B960494DF}">
-                <a14:hiddenLine xmlns="" xmlns:a14="http://schemas.microsoft.com/office/drawing/2010/main" w="9525">
+                <a14:hiddenLine xmlns:a14="http://schemas.microsoft.com/office/drawing/2010/main" xmlns="" w="9525">
                   <a:solidFill>
                     <a:srgbClr val="000000"/>
                   </a:solidFill>
@@ -1377,7 +1377,7 @@
             </a:ln>
             <a:extLst>
               <a:ext uri="{91240B29-F687-4f45-9708-019B960494DF}">
-                <a14:hiddenLine xmlns="" xmlns:a14="http://schemas.microsoft.com/office/drawing/2010/main" w="9525">
+                <a14:hiddenLine xmlns:a14="http://schemas.microsoft.com/office/drawing/2010/main" xmlns="" w="9525">
                   <a:solidFill>
                     <a:srgbClr val="000000"/>
                   </a:solidFill>
@@ -1467,7 +1467,7 @@
             </a:ln>
             <a:extLst>
               <a:ext uri="{91240B29-F687-4f45-9708-019B960494DF}">
-                <a14:hiddenLine xmlns="" xmlns:a14="http://schemas.microsoft.com/office/drawing/2010/main" w="9525">
+                <a14:hiddenLine xmlns:a14="http://schemas.microsoft.com/office/drawing/2010/main" xmlns="" w="9525">
                   <a:solidFill>
                     <a:srgbClr val="000000"/>
                   </a:solidFill>
@@ -1529,7 +1529,7 @@
             </a:ln>
             <a:extLst>
               <a:ext uri="{91240B29-F687-4f45-9708-019B960494DF}">
-                <a14:hiddenLine xmlns="" xmlns:a14="http://schemas.microsoft.com/office/drawing/2010/main" w="9525">
+                <a14:hiddenLine xmlns:a14="http://schemas.microsoft.com/office/drawing/2010/main" xmlns="" w="9525">
                   <a:solidFill>
                     <a:srgbClr val="000000"/>
                   </a:solidFill>
@@ -1619,7 +1619,7 @@
             </a:ln>
             <a:extLst>
               <a:ext uri="{91240B29-F687-4f45-9708-019B960494DF}">
-                <a14:hiddenLine xmlns="" xmlns:a14="http://schemas.microsoft.com/office/drawing/2010/main" w="9525">
+                <a14:hiddenLine xmlns:a14="http://schemas.microsoft.com/office/drawing/2010/main" xmlns="" w="9525">
                   <a:solidFill>
                     <a:srgbClr val="000000"/>
                   </a:solidFill>
@@ -1709,7 +1709,7 @@
             </a:ln>
             <a:extLst>
               <a:ext uri="{91240B29-F687-4f45-9708-019B960494DF}">
-                <a14:hiddenLine xmlns="" xmlns:a14="http://schemas.microsoft.com/office/drawing/2010/main" w="9525">
+                <a14:hiddenLine xmlns:a14="http://schemas.microsoft.com/office/drawing/2010/main" xmlns="" w="9525">
                   <a:solidFill>
                     <a:srgbClr val="000000"/>
                   </a:solidFill>
@@ -1765,7 +1765,7 @@
             </a:ln>
             <a:extLst>
               <a:ext uri="{91240B29-F687-4f45-9708-019B960494DF}">
-                <a14:hiddenLine xmlns="" xmlns:a14="http://schemas.microsoft.com/office/drawing/2010/main" w="9525">
+                <a14:hiddenLine xmlns:a14="http://schemas.microsoft.com/office/drawing/2010/main" xmlns="" w="9525">
                   <a:solidFill>
                     <a:srgbClr val="000000"/>
                   </a:solidFill>
@@ -1855,7 +1855,7 @@
             </a:ln>
             <a:extLst>
               <a:ext uri="{91240B29-F687-4f45-9708-019B960494DF}">
-                <a14:hiddenLine xmlns="" xmlns:a14="http://schemas.microsoft.com/office/drawing/2010/main" w="9525">
+                <a14:hiddenLine xmlns:a14="http://schemas.microsoft.com/office/drawing/2010/main" xmlns="" w="9525">
                   <a:solidFill>
                     <a:srgbClr val="000000"/>
                   </a:solidFill>
@@ -1911,7 +1911,7 @@
             </a:ln>
             <a:extLst>
               <a:ext uri="{91240B29-F687-4f45-9708-019B960494DF}">
-                <a14:hiddenLine xmlns="" xmlns:a14="http://schemas.microsoft.com/office/drawing/2010/main" w="9525">
+                <a14:hiddenLine xmlns:a14="http://schemas.microsoft.com/office/drawing/2010/main" xmlns="" w="9525">
                   <a:solidFill>
                     <a:srgbClr val="000000"/>
                   </a:solidFill>
@@ -2001,7 +2001,7 @@
             </a:ln>
             <a:extLst>
               <a:ext uri="{91240B29-F687-4f45-9708-019B960494DF}">
-                <a14:hiddenLine xmlns="" xmlns:a14="http://schemas.microsoft.com/office/drawing/2010/main" w="9525">
+                <a14:hiddenLine xmlns:a14="http://schemas.microsoft.com/office/drawing/2010/main" xmlns="" w="9525">
                   <a:solidFill>
                     <a:srgbClr val="000000"/>
                   </a:solidFill>
@@ -2069,7 +2069,7 @@
             </a:ln>
             <a:extLst>
               <a:ext uri="{91240B29-F687-4f45-9708-019B960494DF}">
-                <a14:hiddenLine xmlns="" xmlns:a14="http://schemas.microsoft.com/office/drawing/2010/main" w="9525">
+                <a14:hiddenLine xmlns:a14="http://schemas.microsoft.com/office/drawing/2010/main" xmlns="" w="9525">
                   <a:solidFill>
                     <a:srgbClr val="000000"/>
                   </a:solidFill>
@@ -2159,7 +2159,7 @@
             </a:ln>
             <a:extLst>
               <a:ext uri="{91240B29-F687-4f45-9708-019B960494DF}">
-                <a14:hiddenLine xmlns="" xmlns:a14="http://schemas.microsoft.com/office/drawing/2010/main" w="9525">
+                <a14:hiddenLine xmlns:a14="http://schemas.microsoft.com/office/drawing/2010/main" xmlns="" w="9525">
                   <a:solidFill>
                     <a:srgbClr val="000000"/>
                   </a:solidFill>
@@ -2227,7 +2227,7 @@
             </a:ln>
             <a:extLst>
               <a:ext uri="{91240B29-F687-4f45-9708-019B960494DF}">
-                <a14:hiddenLine xmlns="" xmlns:a14="http://schemas.microsoft.com/office/drawing/2010/main" w="9525">
+                <a14:hiddenLine xmlns:a14="http://schemas.microsoft.com/office/drawing/2010/main" xmlns="" w="9525">
                   <a:solidFill>
                     <a:srgbClr val="000000"/>
                   </a:solidFill>
@@ -2317,7 +2317,7 @@
             </a:ln>
             <a:extLst>
               <a:ext uri="{91240B29-F687-4f45-9708-019B960494DF}">
-                <a14:hiddenLine xmlns="" xmlns:a14="http://schemas.microsoft.com/office/drawing/2010/main" w="9525">
+                <a14:hiddenLine xmlns:a14="http://schemas.microsoft.com/office/drawing/2010/main" xmlns="" w="9525">
                   <a:solidFill>
                     <a:srgbClr val="000000"/>
                   </a:solidFill>
@@ -2351,7 +2351,7 @@
             </a:ln>
             <a:extLst>
               <a:ext uri="{91240B29-F687-4f45-9708-019B960494DF}">
-                <a14:hiddenLine xmlns="" xmlns:a14="http://schemas.microsoft.com/office/drawing/2010/main" w="9525">
+                <a14:hiddenLine xmlns:a14="http://schemas.microsoft.com/office/drawing/2010/main" xmlns="" w="9525">
                   <a:solidFill>
                     <a:srgbClr val="000000"/>
                   </a:solidFill>
@@ -2441,7 +2441,7 @@
             </a:ln>
             <a:extLst>
               <a:ext uri="{91240B29-F687-4f45-9708-019B960494DF}">
-                <a14:hiddenLine xmlns="" xmlns:a14="http://schemas.microsoft.com/office/drawing/2010/main" w="9525">
+                <a14:hiddenLine xmlns:a14="http://schemas.microsoft.com/office/drawing/2010/main" xmlns="" w="9525">
                   <a:solidFill>
                     <a:srgbClr val="000000"/>
                   </a:solidFill>
@@ -2503,7 +2503,7 @@
             </a:ln>
             <a:extLst>
               <a:ext uri="{91240B29-F687-4f45-9708-019B960494DF}">
-                <a14:hiddenLine xmlns="" xmlns:a14="http://schemas.microsoft.com/office/drawing/2010/main" w="9525">
+                <a14:hiddenLine xmlns:a14="http://schemas.microsoft.com/office/drawing/2010/main" xmlns="" w="9525">
                   <a:solidFill>
                     <a:srgbClr val="000000"/>
                   </a:solidFill>
@@ -2565,7 +2565,7 @@
             </a:ln>
             <a:extLst>
               <a:ext uri="{91240B29-F687-4f45-9708-019B960494DF}">
-                <a14:hiddenLine xmlns="" xmlns:a14="http://schemas.microsoft.com/office/drawing/2010/main" w="9525">
+                <a14:hiddenLine xmlns:a14="http://schemas.microsoft.com/office/drawing/2010/main" xmlns="" w="9525">
                   <a:solidFill>
                     <a:srgbClr val="000000"/>
                   </a:solidFill>
@@ -2655,7 +2655,7 @@
             </a:ln>
             <a:extLst>
               <a:ext uri="{91240B29-F687-4f45-9708-019B960494DF}">
-                <a14:hiddenLine xmlns="" xmlns:a14="http://schemas.microsoft.com/office/drawing/2010/main" w="9525">
+                <a14:hiddenLine xmlns:a14="http://schemas.microsoft.com/office/drawing/2010/main" xmlns="" w="9525">
                   <a:solidFill>
                     <a:srgbClr val="000000"/>
                   </a:solidFill>
@@ -2723,7 +2723,7 @@
             </a:ln>
             <a:extLst>
               <a:ext uri="{91240B29-F687-4f45-9708-019B960494DF}">
-                <a14:hiddenLine xmlns="" xmlns:a14="http://schemas.microsoft.com/office/drawing/2010/main" w="9525">
+                <a14:hiddenLine xmlns:a14="http://schemas.microsoft.com/office/drawing/2010/main" xmlns="" w="9525">
                   <a:solidFill>
                     <a:srgbClr val="000000"/>
                   </a:solidFill>
@@ -2785,7 +2785,7 @@
             </a:ln>
             <a:extLst>
               <a:ext uri="{91240B29-F687-4f45-9708-019B960494DF}">
-                <a14:hiddenLine xmlns="" xmlns:a14="http://schemas.microsoft.com/office/drawing/2010/main" w="9525">
+                <a14:hiddenLine xmlns:a14="http://schemas.microsoft.com/office/drawing/2010/main" xmlns="" w="9525">
                   <a:solidFill>
                     <a:srgbClr val="000000"/>
                   </a:solidFill>
@@ -2875,7 +2875,7 @@
             </a:ln>
             <a:extLst>
               <a:ext uri="{91240B29-F687-4f45-9708-019B960494DF}">
-                <a14:hiddenLine xmlns="" xmlns:a14="http://schemas.microsoft.com/office/drawing/2010/main" w="9525">
+                <a14:hiddenLine xmlns:a14="http://schemas.microsoft.com/office/drawing/2010/main" xmlns="" w="9525">
                   <a:solidFill>
                     <a:srgbClr val="000000"/>
                   </a:solidFill>
@@ -2937,7 +2937,7 @@
             </a:ln>
             <a:extLst>
               <a:ext uri="{91240B29-F687-4f45-9708-019B960494DF}">
-                <a14:hiddenLine xmlns="" xmlns:a14="http://schemas.microsoft.com/office/drawing/2010/main" w="9525">
+                <a14:hiddenLine xmlns:a14="http://schemas.microsoft.com/office/drawing/2010/main" xmlns="" w="9525">
                   <a:solidFill>
                     <a:srgbClr val="000000"/>
                   </a:solidFill>
@@ -3027,7 +3027,7 @@
             </a:ln>
             <a:extLst>
               <a:ext uri="{91240B29-F687-4f45-9708-019B960494DF}">
-                <a14:hiddenLine xmlns="" xmlns:a14="http://schemas.microsoft.com/office/drawing/2010/main" w="9525">
+                <a14:hiddenLine xmlns:a14="http://schemas.microsoft.com/office/drawing/2010/main" xmlns="" w="9525">
                   <a:solidFill>
                     <a:srgbClr val="000000"/>
                   </a:solidFill>
@@ -3089,7 +3089,7 @@
             </a:ln>
             <a:extLst>
               <a:ext uri="{91240B29-F687-4f45-9708-019B960494DF}">
-                <a14:hiddenLine xmlns="" xmlns:a14="http://schemas.microsoft.com/office/drawing/2010/main" w="9525">
+                <a14:hiddenLine xmlns:a14="http://schemas.microsoft.com/office/drawing/2010/main" xmlns="" w="9525">
                   <a:solidFill>
                     <a:srgbClr val="000000"/>
                   </a:solidFill>
@@ -3179,7 +3179,7 @@
             </a:ln>
             <a:extLst>
               <a:ext uri="{91240B29-F687-4f45-9708-019B960494DF}">
-                <a14:hiddenLine xmlns="" xmlns:a14="http://schemas.microsoft.com/office/drawing/2010/main" w="9525">
+                <a14:hiddenLine xmlns:a14="http://schemas.microsoft.com/office/drawing/2010/main" xmlns="" w="9525">
                   <a:solidFill>
                     <a:srgbClr val="000000"/>
                   </a:solidFill>
@@ -3213,7 +3213,7 @@
             </a:ln>
             <a:extLst>
               <a:ext uri="{91240B29-F687-4f45-9708-019B960494DF}">
-                <a14:hiddenLine xmlns="" xmlns:a14="http://schemas.microsoft.com/office/drawing/2010/main" w="9525">
+                <a14:hiddenLine xmlns:a14="http://schemas.microsoft.com/office/drawing/2010/main" xmlns="" w="9525">
                   <a:solidFill>
                     <a:srgbClr val="000000"/>
                   </a:solidFill>
@@ -3278,7 +3278,7 @@
             </a:ln>
             <a:extLst>
               <a:ext uri="{91240B29-F687-4f45-9708-019B960494DF}">
-                <a14:hiddenLine xmlns="" xmlns:a14="http://schemas.microsoft.com/office/drawing/2010/main" w="9525">
+                <a14:hiddenLine xmlns:a14="http://schemas.microsoft.com/office/drawing/2010/main" xmlns="" w="9525">
                   <a:solidFill>
                     <a:srgbClr val="000000"/>
                   </a:solidFill>
@@ -3368,7 +3368,7 @@
             </a:ln>
             <a:extLst>
               <a:ext uri="{91240B29-F687-4f45-9708-019B960494DF}">
-                <a14:hiddenLine xmlns="" xmlns:a14="http://schemas.microsoft.com/office/drawing/2010/main" w="9525">
+                <a14:hiddenLine xmlns:a14="http://schemas.microsoft.com/office/drawing/2010/main" xmlns="" w="9525">
                   <a:solidFill>
                     <a:srgbClr val="000000"/>
                   </a:solidFill>
@@ -3430,7 +3430,7 @@
             </a:ln>
             <a:extLst>
               <a:ext uri="{91240B29-F687-4f45-9708-019B960494DF}">
-                <a14:hiddenLine xmlns="" xmlns:a14="http://schemas.microsoft.com/office/drawing/2010/main" w="9525">
+                <a14:hiddenLine xmlns:a14="http://schemas.microsoft.com/office/drawing/2010/main" xmlns="" w="9525">
                   <a:solidFill>
                     <a:srgbClr val="000000"/>
                   </a:solidFill>
@@ -3520,7 +3520,7 @@
             </a:ln>
             <a:extLst>
               <a:ext uri="{91240B29-F687-4f45-9708-019B960494DF}">
-                <a14:hiddenLine xmlns="" xmlns:a14="http://schemas.microsoft.com/office/drawing/2010/main" w="9525">
+                <a14:hiddenLine xmlns:a14="http://schemas.microsoft.com/office/drawing/2010/main" xmlns="" w="9525">
                   <a:solidFill>
                     <a:srgbClr val="000000"/>
                   </a:solidFill>
@@ -3610,7 +3610,7 @@
             </a:ln>
             <a:extLst>
               <a:ext uri="{91240B29-F687-4f45-9708-019B960494DF}">
-                <a14:hiddenLine xmlns="" xmlns:a14="http://schemas.microsoft.com/office/drawing/2010/main" w="9525">
+                <a14:hiddenLine xmlns:a14="http://schemas.microsoft.com/office/drawing/2010/main" xmlns="" w="9525">
                   <a:solidFill>
                     <a:srgbClr val="000000"/>
                   </a:solidFill>
@@ -3675,7 +3675,7 @@
             </a:ln>
             <a:extLst>
               <a:ext uri="{91240B29-F687-4f45-9708-019B960494DF}">
-                <a14:hiddenLine xmlns="" xmlns:a14="http://schemas.microsoft.com/office/drawing/2010/main" w="9525">
+                <a14:hiddenLine xmlns:a14="http://schemas.microsoft.com/office/drawing/2010/main" xmlns="" w="9525">
                   <a:solidFill>
                     <a:srgbClr val="000000"/>
                   </a:solidFill>
@@ -3737,7 +3737,7 @@
             </a:ln>
             <a:extLst>
               <a:ext uri="{91240B29-F687-4f45-9708-019B960494DF}">
-                <a14:hiddenLine xmlns="" xmlns:a14="http://schemas.microsoft.com/office/drawing/2010/main" w="9525">
+                <a14:hiddenLine xmlns:a14="http://schemas.microsoft.com/office/drawing/2010/main" xmlns="" w="9525">
                   <a:solidFill>
                     <a:srgbClr val="000000"/>
                   </a:solidFill>
@@ -3827,7 +3827,7 @@
             </a:ln>
             <a:extLst>
               <a:ext uri="{91240B29-F687-4f45-9708-019B960494DF}">
-                <a14:hiddenLine xmlns="" xmlns:a14="http://schemas.microsoft.com/office/drawing/2010/main" w="9525">
+                <a14:hiddenLine xmlns:a14="http://schemas.microsoft.com/office/drawing/2010/main" xmlns="" w="9525">
                   <a:solidFill>
                     <a:srgbClr val="000000"/>
                   </a:solidFill>
@@ -3917,7 +3917,7 @@
             </a:ln>
             <a:extLst>
               <a:ext uri="{91240B29-F687-4f45-9708-019B960494DF}">
-                <a14:hiddenLine xmlns="" xmlns:a14="http://schemas.microsoft.com/office/drawing/2010/main" w="9525">
+                <a14:hiddenLine xmlns:a14="http://schemas.microsoft.com/office/drawing/2010/main" xmlns="" w="9525">
                   <a:solidFill>
                     <a:srgbClr val="000000"/>
                   </a:solidFill>
@@ -3979,7 +3979,7 @@
             </a:ln>
             <a:extLst>
               <a:ext uri="{91240B29-F687-4f45-9708-019B960494DF}">
-                <a14:hiddenLine xmlns="" xmlns:a14="http://schemas.microsoft.com/office/drawing/2010/main" w="9525">
+                <a14:hiddenLine xmlns:a14="http://schemas.microsoft.com/office/drawing/2010/main" xmlns="" w="9525">
                   <a:solidFill>
                     <a:srgbClr val="000000"/>
                   </a:solidFill>
@@ -4099,7 +4099,7 @@
             </a:ln>
             <a:extLst>
               <a:ext uri="{91240B29-F687-4f45-9708-019B960494DF}">
-                <a14:hiddenLine xmlns="" xmlns:a14="http://schemas.microsoft.com/office/drawing/2010/main" w="9525">
+                <a14:hiddenLine xmlns:a14="http://schemas.microsoft.com/office/drawing/2010/main" xmlns="" w="9525">
                   <a:solidFill>
                     <a:srgbClr val="000000"/>
                   </a:solidFill>
@@ -4167,7 +4167,7 @@
             </a:ln>
             <a:extLst>
               <a:ext uri="{91240B29-F687-4f45-9708-019B960494DF}">
-                <a14:hiddenLine xmlns="" xmlns:a14="http://schemas.microsoft.com/office/drawing/2010/main" w="9525">
+                <a14:hiddenLine xmlns:a14="http://schemas.microsoft.com/office/drawing/2010/main" xmlns="" w="9525">
                   <a:solidFill>
                     <a:srgbClr val="000000"/>
                   </a:solidFill>
@@ -4257,7 +4257,7 @@
             </a:ln>
             <a:extLst>
               <a:ext uri="{91240B29-F687-4f45-9708-019B960494DF}">
-                <a14:hiddenLine xmlns="" xmlns:a14="http://schemas.microsoft.com/office/drawing/2010/main" w="9525">
+                <a14:hiddenLine xmlns:a14="http://schemas.microsoft.com/office/drawing/2010/main" xmlns="" w="9525">
                   <a:solidFill>
                     <a:srgbClr val="000000"/>
                   </a:solidFill>
@@ -4297,7 +4297,7 @@
           </a:lstStyle>
           <a:p>
             <a:r>
-              <a:rPr lang="pt-PT" smtClean="0"/>
+              <a:rPr lang="pt-PT"/>
               <a:t>Clique para editar o estilo</a:t>
             </a:r>
             <a:endParaRPr lang="en-US" dirty="0"/>
@@ -4368,7 +4368,7 @@
           </a:lstStyle>
           <a:p>
             <a:r>
-              <a:rPr lang="pt-PT" smtClean="0"/>
+              <a:rPr lang="pt-PT"/>
               <a:t>Faça clique para editar o estilo</a:t>
             </a:r>
             <a:endParaRPr lang="en-US" dirty="0"/>
@@ -4397,7 +4397,7 @@
           <a:p>
             <a:fld id="{083BC3CC-BECB-4EB9-A7C8-85972E772A57}" type="datetimeFigureOut">
               <a:rPr lang="pt-PT" smtClean="0"/>
-              <a:t>16/05/2021</a:t>
+              <a:t>22/05/2021</a:t>
             </a:fld>
             <a:endParaRPr lang="pt-PT"/>
           </a:p>
@@ -4449,7 +4449,7 @@
           <a:p>
             <a:fld id="{8880C9D9-2477-4696-9376-C922EAD71C8B}" type="slidenum">
               <a:rPr lang="pt-PT" smtClean="0"/>
-              <a:t>‹nº›</a:t>
+              <a:t>‹#›</a:t>
             </a:fld>
             <a:endParaRPr lang="pt-PT"/>
           </a:p>
@@ -4512,7 +4512,7 @@
           </a:lstStyle>
           <a:p>
             <a:r>
-              <a:rPr lang="pt-PT" smtClean="0"/>
+              <a:rPr lang="pt-PT"/>
               <a:t>Clique para editar o estilo</a:t>
             </a:r>
             <a:endParaRPr lang="en-US" dirty="0"/>
@@ -4573,7 +4573,7 @@
               <a:buNone/>
             </a:pPr>
             <a:r>
-              <a:rPr lang="pt-PT" smtClean="0"/>
+              <a:rPr lang="pt-PT"/>
               <a:t>Clique no ícone para adicionar uma imagem</a:t>
             </a:r>
             <a:endParaRPr lang="en-US" dirty="0"/>
@@ -4641,7 +4641,7 @@
           <a:p>
             <a:pPr lvl="0"/>
             <a:r>
-              <a:rPr lang="pt-PT" smtClean="0"/>
+              <a:rPr lang="pt-PT"/>
               <a:t>Clique para editar os estilos</a:t>
             </a:r>
           </a:p>
@@ -4664,7 +4664,7 @@
           <a:p>
             <a:fld id="{083BC3CC-BECB-4EB9-A7C8-85972E772A57}" type="datetimeFigureOut">
               <a:rPr lang="pt-PT" smtClean="0"/>
-              <a:t>16/05/2021</a:t>
+              <a:t>22/05/2021</a:t>
             </a:fld>
             <a:endParaRPr lang="pt-PT"/>
           </a:p>
@@ -4706,7 +4706,7 @@
           <a:p>
             <a:fld id="{8880C9D9-2477-4696-9376-C922EAD71C8B}" type="slidenum">
               <a:rPr lang="pt-PT" smtClean="0"/>
-              <a:t>‹nº›</a:t>
+              <a:t>‹#›</a:t>
             </a:fld>
             <a:endParaRPr lang="pt-PT"/>
           </a:p>
@@ -4769,7 +4769,7 @@
           </a:lstStyle>
           <a:p>
             <a:r>
-              <a:rPr lang="pt-PT" smtClean="0"/>
+              <a:rPr lang="pt-PT"/>
               <a:t>Clique para editar o estilo</a:t>
             </a:r>
             <a:endParaRPr lang="en-US" dirty="0"/>
@@ -4837,7 +4837,7 @@
           <a:p>
             <a:pPr lvl="0"/>
             <a:r>
-              <a:rPr lang="pt-PT" smtClean="0"/>
+              <a:rPr lang="pt-PT"/>
               <a:t>Clique para editar os estilos</a:t>
             </a:r>
           </a:p>
@@ -4860,7 +4860,7 @@
           <a:p>
             <a:fld id="{083BC3CC-BECB-4EB9-A7C8-85972E772A57}" type="datetimeFigureOut">
               <a:rPr lang="pt-PT" smtClean="0"/>
-              <a:t>16/05/2021</a:t>
+              <a:t>22/05/2021</a:t>
             </a:fld>
             <a:endParaRPr lang="pt-PT"/>
           </a:p>
@@ -4902,7 +4902,7 @@
           <a:p>
             <a:fld id="{8880C9D9-2477-4696-9376-C922EAD71C8B}" type="slidenum">
               <a:rPr lang="pt-PT" smtClean="0"/>
-              <a:t>‹nº›</a:t>
+              <a:t>‹#›</a:t>
             </a:fld>
             <a:endParaRPr lang="pt-PT"/>
           </a:p>
@@ -4965,7 +4965,7 @@
           </a:lstStyle>
           <a:p>
             <a:r>
-              <a:rPr lang="pt-PT" smtClean="0"/>
+              <a:rPr lang="pt-PT"/>
               <a:t>Clique para editar o estilo</a:t>
             </a:r>
             <a:endParaRPr lang="en-US" dirty="0"/>
@@ -5033,7 +5033,7 @@
           <a:p>
             <a:pPr lvl="0"/>
             <a:r>
-              <a:rPr lang="pt-PT" smtClean="0"/>
+              <a:rPr lang="pt-PT"/>
               <a:t>Clique para editar os estilos</a:t>
             </a:r>
           </a:p>
@@ -5100,7 +5100,7 @@
           <a:p>
             <a:pPr lvl="0"/>
             <a:r>
-              <a:rPr lang="pt-PT" smtClean="0"/>
+              <a:rPr lang="pt-PT"/>
               <a:t>Clique para editar os estilos</a:t>
             </a:r>
           </a:p>
@@ -5123,7 +5123,7 @@
           <a:p>
             <a:fld id="{083BC3CC-BECB-4EB9-A7C8-85972E772A57}" type="datetimeFigureOut">
               <a:rPr lang="pt-PT" smtClean="0"/>
-              <a:t>16/05/2021</a:t>
+              <a:t>22/05/2021</a:t>
             </a:fld>
             <a:endParaRPr lang="pt-PT"/>
           </a:p>
@@ -5165,7 +5165,7 @@
           <a:p>
             <a:fld id="{8880C9D9-2477-4696-9376-C922EAD71C8B}" type="slidenum">
               <a:rPr lang="pt-PT" smtClean="0"/>
-              <a:t>‹nº›</a:t>
+              <a:t>‹#›</a:t>
             </a:fld>
             <a:endParaRPr lang="pt-PT"/>
           </a:p>
@@ -5466,7 +5466,7 @@
           </a:lstStyle>
           <a:p>
             <a:r>
-              <a:rPr lang="pt-PT" smtClean="0"/>
+              <a:rPr lang="pt-PT"/>
               <a:t>Clique para editar o estilo</a:t>
             </a:r>
             <a:endParaRPr lang="en-US" dirty="0"/>
@@ -5534,7 +5534,7 @@
           <a:p>
             <a:pPr lvl="0"/>
             <a:r>
-              <a:rPr lang="pt-PT" smtClean="0"/>
+              <a:rPr lang="pt-PT"/>
               <a:t>Clique para editar os estilos</a:t>
             </a:r>
           </a:p>
@@ -5557,7 +5557,7 @@
           <a:p>
             <a:fld id="{083BC3CC-BECB-4EB9-A7C8-85972E772A57}" type="datetimeFigureOut">
               <a:rPr lang="pt-PT" smtClean="0"/>
-              <a:t>16/05/2021</a:t>
+              <a:t>22/05/2021</a:t>
             </a:fld>
             <a:endParaRPr lang="pt-PT"/>
           </a:p>
@@ -5599,7 +5599,7 @@
           <a:p>
             <a:fld id="{8880C9D9-2477-4696-9376-C922EAD71C8B}" type="slidenum">
               <a:rPr lang="pt-PT" smtClean="0"/>
-              <a:t>‹nº›</a:t>
+              <a:t>‹#›</a:t>
             </a:fld>
             <a:endParaRPr lang="pt-PT"/>
           </a:p>
@@ -5656,7 +5656,7 @@
           <a:lstStyle/>
           <a:p>
             <a:r>
-              <a:rPr lang="pt-PT" smtClean="0"/>
+              <a:rPr lang="pt-PT"/>
               <a:t>Clique para editar o estilo</a:t>
             </a:r>
             <a:endParaRPr lang="en-US" dirty="0"/>
@@ -5731,7 +5731,7 @@
           <a:p>
             <a:pPr lvl="0"/>
             <a:r>
-              <a:rPr lang="pt-PT" smtClean="0"/>
+              <a:rPr lang="pt-PT"/>
               <a:t>Clique para editar os estilos</a:t>
             </a:r>
           </a:p>
@@ -5798,7 +5798,7 @@
           <a:p>
             <a:pPr lvl="0"/>
             <a:r>
-              <a:rPr lang="pt-PT" smtClean="0"/>
+              <a:rPr lang="pt-PT"/>
               <a:t>Clique para editar os estilos</a:t>
             </a:r>
           </a:p>
@@ -5872,7 +5872,7 @@
           <a:p>
             <a:pPr lvl="0"/>
             <a:r>
-              <a:rPr lang="pt-PT" smtClean="0"/>
+              <a:rPr lang="pt-PT"/>
               <a:t>Clique para editar os estilos</a:t>
             </a:r>
           </a:p>
@@ -5939,7 +5939,7 @@
           <a:p>
             <a:pPr lvl="0"/>
             <a:r>
-              <a:rPr lang="pt-PT" smtClean="0"/>
+              <a:rPr lang="pt-PT"/>
               <a:t>Clique para editar os estilos</a:t>
             </a:r>
           </a:p>
@@ -6013,7 +6013,7 @@
           <a:p>
             <a:pPr lvl="0"/>
             <a:r>
-              <a:rPr lang="pt-PT" smtClean="0"/>
+              <a:rPr lang="pt-PT"/>
               <a:t>Clique para editar os estilos</a:t>
             </a:r>
           </a:p>
@@ -6080,7 +6080,7 @@
           <a:p>
             <a:pPr lvl="0"/>
             <a:r>
-              <a:rPr lang="pt-PT" smtClean="0"/>
+              <a:rPr lang="pt-PT"/>
               <a:t>Clique para editar os estilos</a:t>
             </a:r>
           </a:p>
@@ -6103,7 +6103,7 @@
           <a:p>
             <a:fld id="{083BC3CC-BECB-4EB9-A7C8-85972E772A57}" type="datetimeFigureOut">
               <a:rPr lang="pt-PT" smtClean="0"/>
-              <a:t>16/05/2021</a:t>
+              <a:t>22/05/2021</a:t>
             </a:fld>
             <a:endParaRPr lang="pt-PT"/>
           </a:p>
@@ -6145,7 +6145,7 @@
           <a:p>
             <a:fld id="{8880C9D9-2477-4696-9376-C922EAD71C8B}" type="slidenum">
               <a:rPr lang="pt-PT" smtClean="0"/>
-              <a:t>‹nº›</a:t>
+              <a:t>‹#›</a:t>
             </a:fld>
             <a:endParaRPr lang="pt-PT"/>
           </a:p>
@@ -6202,7 +6202,7 @@
           <a:lstStyle/>
           <a:p>
             <a:r>
-              <a:rPr lang="pt-PT" smtClean="0"/>
+              <a:rPr lang="pt-PT"/>
               <a:t>Clique para editar o estilo</a:t>
             </a:r>
             <a:endParaRPr lang="en-US" dirty="0"/>
@@ -6277,7 +6277,7 @@
           <a:p>
             <a:pPr lvl="0"/>
             <a:r>
-              <a:rPr lang="pt-PT" smtClean="0"/>
+              <a:rPr lang="pt-PT"/>
               <a:t>Clique para editar os estilos</a:t>
             </a:r>
           </a:p>
@@ -6334,7 +6334,7 @@
               <a:buNone/>
             </a:pPr>
             <a:r>
-              <a:rPr lang="pt-PT" smtClean="0"/>
+              <a:rPr lang="pt-PT"/>
               <a:t>Clique no ícone para adicionar uma imagem</a:t>
             </a:r>
             <a:endParaRPr lang="en-US" dirty="0"/>
@@ -6402,7 +6402,7 @@
           <a:p>
             <a:pPr lvl="0"/>
             <a:r>
-              <a:rPr lang="pt-PT" smtClean="0"/>
+              <a:rPr lang="pt-PT"/>
               <a:t>Clique para editar os estilos</a:t>
             </a:r>
           </a:p>
@@ -6476,7 +6476,7 @@
           <a:p>
             <a:pPr lvl="0"/>
             <a:r>
-              <a:rPr lang="pt-PT" smtClean="0"/>
+              <a:rPr lang="pt-PT"/>
               <a:t>Clique para editar os estilos</a:t>
             </a:r>
           </a:p>
@@ -6533,7 +6533,7 @@
               <a:buNone/>
             </a:pPr>
             <a:r>
-              <a:rPr lang="pt-PT" smtClean="0"/>
+              <a:rPr lang="pt-PT"/>
               <a:t>Clique no ícone para adicionar uma imagem</a:t>
             </a:r>
             <a:endParaRPr lang="en-US" dirty="0"/>
@@ -6601,7 +6601,7 @@
           <a:p>
             <a:pPr lvl="0"/>
             <a:r>
-              <a:rPr lang="pt-PT" smtClean="0"/>
+              <a:rPr lang="pt-PT"/>
               <a:t>Clique para editar os estilos</a:t>
             </a:r>
           </a:p>
@@ -6675,7 +6675,7 @@
           <a:p>
             <a:pPr lvl="0"/>
             <a:r>
-              <a:rPr lang="pt-PT" smtClean="0"/>
+              <a:rPr lang="pt-PT"/>
               <a:t>Clique para editar os estilos</a:t>
             </a:r>
           </a:p>
@@ -6732,7 +6732,7 @@
               <a:buNone/>
             </a:pPr>
             <a:r>
-              <a:rPr lang="pt-PT" smtClean="0"/>
+              <a:rPr lang="pt-PT"/>
               <a:t>Clique no ícone para adicionar uma imagem</a:t>
             </a:r>
             <a:endParaRPr lang="en-US" dirty="0"/>
@@ -6800,7 +6800,7 @@
           <a:p>
             <a:pPr lvl="0"/>
             <a:r>
-              <a:rPr lang="pt-PT" smtClean="0"/>
+              <a:rPr lang="pt-PT"/>
               <a:t>Clique para editar os estilos</a:t>
             </a:r>
           </a:p>
@@ -6823,7 +6823,7 @@
           <a:p>
             <a:fld id="{083BC3CC-BECB-4EB9-A7C8-85972E772A57}" type="datetimeFigureOut">
               <a:rPr lang="pt-PT" smtClean="0"/>
-              <a:t>16/05/2021</a:t>
+              <a:t>22/05/2021</a:t>
             </a:fld>
             <a:endParaRPr lang="pt-PT"/>
           </a:p>
@@ -6865,7 +6865,7 @@
           <a:p>
             <a:fld id="{8880C9D9-2477-4696-9376-C922EAD71C8B}" type="slidenum">
               <a:rPr lang="pt-PT" smtClean="0"/>
-              <a:t>‹nº›</a:t>
+              <a:t>‹#›</a:t>
             </a:fld>
             <a:endParaRPr lang="pt-PT"/>
           </a:p>
@@ -6917,7 +6917,7 @@
           <a:lstStyle/>
           <a:p>
             <a:r>
-              <a:rPr lang="pt-PT" smtClean="0"/>
+              <a:rPr lang="pt-PT"/>
               <a:t>Clique para editar o estilo</a:t>
             </a:r>
             <a:endParaRPr lang="en-US" dirty="0"/>
@@ -6941,35 +6941,35 @@
           <a:p>
             <a:pPr lvl="0"/>
             <a:r>
-              <a:rPr lang="pt-PT" smtClean="0"/>
+              <a:rPr lang="pt-PT"/>
               <a:t>Clique para editar os estilos</a:t>
             </a:r>
           </a:p>
           <a:p>
             <a:pPr lvl="1"/>
             <a:r>
-              <a:rPr lang="pt-PT" smtClean="0"/>
+              <a:rPr lang="pt-PT"/>
               <a:t>Segundo nível</a:t>
             </a:r>
           </a:p>
           <a:p>
             <a:pPr lvl="2"/>
             <a:r>
-              <a:rPr lang="pt-PT" smtClean="0"/>
+              <a:rPr lang="pt-PT"/>
               <a:t>Terceiro nível</a:t>
             </a:r>
           </a:p>
           <a:p>
             <a:pPr lvl="3"/>
             <a:r>
-              <a:rPr lang="pt-PT" smtClean="0"/>
+              <a:rPr lang="pt-PT"/>
               <a:t>Quarto nível</a:t>
             </a:r>
           </a:p>
           <a:p>
             <a:pPr lvl="4"/>
             <a:r>
-              <a:rPr lang="pt-PT" smtClean="0"/>
+              <a:rPr lang="pt-PT"/>
               <a:t>Quinto nível</a:t>
             </a:r>
             <a:endParaRPr lang="en-US" dirty="0"/>
@@ -6993,7 +6993,7 @@
           <a:p>
             <a:fld id="{083BC3CC-BECB-4EB9-A7C8-85972E772A57}" type="datetimeFigureOut">
               <a:rPr lang="pt-PT" smtClean="0"/>
-              <a:t>16/05/2021</a:t>
+              <a:t>22/05/2021</a:t>
             </a:fld>
             <a:endParaRPr lang="pt-PT"/>
           </a:p>
@@ -7035,7 +7035,7 @@
           <a:p>
             <a:fld id="{8880C9D9-2477-4696-9376-C922EAD71C8B}" type="slidenum">
               <a:rPr lang="pt-PT" smtClean="0"/>
-              <a:t>‹nº›</a:t>
+              <a:t>‹#›</a:t>
             </a:fld>
             <a:endParaRPr lang="pt-PT"/>
           </a:p>
@@ -7092,7 +7092,7 @@
           <a:lstStyle/>
           <a:p>
             <a:r>
-              <a:rPr lang="pt-PT" smtClean="0"/>
+              <a:rPr lang="pt-PT"/>
               <a:t>Clique para editar o estilo</a:t>
             </a:r>
             <a:endParaRPr lang="en-US" dirty="0"/>
@@ -7121,35 +7121,35 @@
           <a:p>
             <a:pPr lvl="0"/>
             <a:r>
-              <a:rPr lang="pt-PT" smtClean="0"/>
+              <a:rPr lang="pt-PT"/>
               <a:t>Clique para editar os estilos</a:t>
             </a:r>
           </a:p>
           <a:p>
             <a:pPr lvl="1"/>
             <a:r>
-              <a:rPr lang="pt-PT" smtClean="0"/>
+              <a:rPr lang="pt-PT"/>
               <a:t>Segundo nível</a:t>
             </a:r>
           </a:p>
           <a:p>
             <a:pPr lvl="2"/>
             <a:r>
-              <a:rPr lang="pt-PT" smtClean="0"/>
+              <a:rPr lang="pt-PT"/>
               <a:t>Terceiro nível</a:t>
             </a:r>
           </a:p>
           <a:p>
             <a:pPr lvl="3"/>
             <a:r>
-              <a:rPr lang="pt-PT" smtClean="0"/>
+              <a:rPr lang="pt-PT"/>
               <a:t>Quarto nível</a:t>
             </a:r>
           </a:p>
           <a:p>
             <a:pPr lvl="4"/>
             <a:r>
-              <a:rPr lang="pt-PT" smtClean="0"/>
+              <a:rPr lang="pt-PT"/>
               <a:t>Quinto nível</a:t>
             </a:r>
             <a:endParaRPr lang="en-US" dirty="0"/>
@@ -7173,7 +7173,7 @@
           <a:p>
             <a:fld id="{083BC3CC-BECB-4EB9-A7C8-85972E772A57}" type="datetimeFigureOut">
               <a:rPr lang="pt-PT" smtClean="0"/>
-              <a:t>16/05/2021</a:t>
+              <a:t>22/05/2021</a:t>
             </a:fld>
             <a:endParaRPr lang="pt-PT"/>
           </a:p>
@@ -7215,7 +7215,7 @@
           <a:p>
             <a:fld id="{8880C9D9-2477-4696-9376-C922EAD71C8B}" type="slidenum">
               <a:rPr lang="pt-PT" smtClean="0"/>
-              <a:t>‹nº›</a:t>
+              <a:t>‹#›</a:t>
             </a:fld>
             <a:endParaRPr lang="pt-PT"/>
           </a:p>
@@ -7267,7 +7267,7 @@
           <a:lstStyle/>
           <a:p>
             <a:r>
-              <a:rPr lang="pt-PT" smtClean="0"/>
+              <a:rPr lang="pt-PT"/>
               <a:t>Clique para editar o estilo</a:t>
             </a:r>
             <a:endParaRPr lang="en-US" dirty="0"/>
@@ -7291,35 +7291,35 @@
           <a:p>
             <a:pPr lvl="0"/>
             <a:r>
-              <a:rPr lang="pt-PT" smtClean="0"/>
+              <a:rPr lang="pt-PT"/>
               <a:t>Clique para editar os estilos</a:t>
             </a:r>
           </a:p>
           <a:p>
             <a:pPr lvl="1"/>
             <a:r>
-              <a:rPr lang="pt-PT" smtClean="0"/>
+              <a:rPr lang="pt-PT"/>
               <a:t>Segundo nível</a:t>
             </a:r>
           </a:p>
           <a:p>
             <a:pPr lvl="2"/>
             <a:r>
-              <a:rPr lang="pt-PT" smtClean="0"/>
+              <a:rPr lang="pt-PT"/>
               <a:t>Terceiro nível</a:t>
             </a:r>
           </a:p>
           <a:p>
             <a:pPr lvl="3"/>
             <a:r>
-              <a:rPr lang="pt-PT" smtClean="0"/>
+              <a:rPr lang="pt-PT"/>
               <a:t>Quarto nível</a:t>
             </a:r>
           </a:p>
           <a:p>
             <a:pPr lvl="4"/>
             <a:r>
-              <a:rPr lang="pt-PT" smtClean="0"/>
+              <a:rPr lang="pt-PT"/>
               <a:t>Quinto nível</a:t>
             </a:r>
             <a:endParaRPr lang="en-US" dirty="0"/>
@@ -7343,7 +7343,7 @@
           <a:p>
             <a:fld id="{083BC3CC-BECB-4EB9-A7C8-85972E772A57}" type="datetimeFigureOut">
               <a:rPr lang="pt-PT" smtClean="0"/>
-              <a:t>16/05/2021</a:t>
+              <a:t>22/05/2021</a:t>
             </a:fld>
             <a:endParaRPr lang="pt-PT"/>
           </a:p>
@@ -7385,7 +7385,7 @@
           <a:p>
             <a:fld id="{8880C9D9-2477-4696-9376-C922EAD71C8B}" type="slidenum">
               <a:rPr lang="pt-PT" smtClean="0"/>
-              <a:t>‹nº›</a:t>
+              <a:t>‹#›</a:t>
             </a:fld>
             <a:endParaRPr lang="pt-PT"/>
           </a:p>
@@ -7448,7 +7448,7 @@
           </a:lstStyle>
           <a:p>
             <a:r>
-              <a:rPr lang="pt-PT" smtClean="0"/>
+              <a:rPr lang="pt-PT"/>
               <a:t>Clique para editar o estilo</a:t>
             </a:r>
             <a:endParaRPr lang="en-US" dirty="0"/>
@@ -7570,7 +7570,7 @@
           <a:p>
             <a:pPr lvl="0"/>
             <a:r>
-              <a:rPr lang="pt-PT" smtClean="0"/>
+              <a:rPr lang="pt-PT"/>
               <a:t>Clique para editar os estilos</a:t>
             </a:r>
           </a:p>
@@ -7593,7 +7593,7 @@
           <a:p>
             <a:fld id="{083BC3CC-BECB-4EB9-A7C8-85972E772A57}" type="datetimeFigureOut">
               <a:rPr lang="pt-PT" smtClean="0"/>
-              <a:t>16/05/2021</a:t>
+              <a:t>22/05/2021</a:t>
             </a:fld>
             <a:endParaRPr lang="pt-PT"/>
           </a:p>
@@ -7635,7 +7635,7 @@
           <a:p>
             <a:fld id="{8880C9D9-2477-4696-9376-C922EAD71C8B}" type="slidenum">
               <a:rPr lang="pt-PT" smtClean="0"/>
-              <a:t>‹nº›</a:t>
+              <a:t>‹#›</a:t>
             </a:fld>
             <a:endParaRPr lang="pt-PT"/>
           </a:p>
@@ -7687,7 +7687,7 @@
           <a:lstStyle/>
           <a:p>
             <a:r>
-              <a:rPr lang="pt-PT" smtClean="0"/>
+              <a:rPr lang="pt-PT"/>
               <a:t>Clique para editar o estilo</a:t>
             </a:r>
             <a:endParaRPr lang="en-US" dirty="0"/>
@@ -7716,35 +7716,35 @@
           <a:p>
             <a:pPr lvl="0"/>
             <a:r>
-              <a:rPr lang="pt-PT" smtClean="0"/>
+              <a:rPr lang="pt-PT"/>
               <a:t>Clique para editar os estilos</a:t>
             </a:r>
           </a:p>
           <a:p>
             <a:pPr lvl="1"/>
             <a:r>
-              <a:rPr lang="pt-PT" smtClean="0"/>
+              <a:rPr lang="pt-PT"/>
               <a:t>Segundo nível</a:t>
             </a:r>
           </a:p>
           <a:p>
             <a:pPr lvl="2"/>
             <a:r>
-              <a:rPr lang="pt-PT" smtClean="0"/>
+              <a:rPr lang="pt-PT"/>
               <a:t>Terceiro nível</a:t>
             </a:r>
           </a:p>
           <a:p>
             <a:pPr lvl="3"/>
             <a:r>
-              <a:rPr lang="pt-PT" smtClean="0"/>
+              <a:rPr lang="pt-PT"/>
               <a:t>Quarto nível</a:t>
             </a:r>
           </a:p>
           <a:p>
             <a:pPr lvl="4"/>
             <a:r>
-              <a:rPr lang="pt-PT" smtClean="0"/>
+              <a:rPr lang="pt-PT"/>
               <a:t>Quinto nível</a:t>
             </a:r>
             <a:endParaRPr lang="en-US" dirty="0"/>
@@ -7773,35 +7773,35 @@
           <a:p>
             <a:pPr lvl="0"/>
             <a:r>
-              <a:rPr lang="pt-PT" smtClean="0"/>
+              <a:rPr lang="pt-PT"/>
               <a:t>Clique para editar os estilos</a:t>
             </a:r>
           </a:p>
           <a:p>
             <a:pPr lvl="1"/>
             <a:r>
-              <a:rPr lang="pt-PT" smtClean="0"/>
+              <a:rPr lang="pt-PT"/>
               <a:t>Segundo nível</a:t>
             </a:r>
           </a:p>
           <a:p>
             <a:pPr lvl="2"/>
             <a:r>
-              <a:rPr lang="pt-PT" smtClean="0"/>
+              <a:rPr lang="pt-PT"/>
               <a:t>Terceiro nível</a:t>
             </a:r>
           </a:p>
           <a:p>
             <a:pPr lvl="3"/>
             <a:r>
-              <a:rPr lang="pt-PT" smtClean="0"/>
+              <a:rPr lang="pt-PT"/>
               <a:t>Quarto nível</a:t>
             </a:r>
           </a:p>
           <a:p>
             <a:pPr lvl="4"/>
             <a:r>
-              <a:rPr lang="pt-PT" smtClean="0"/>
+              <a:rPr lang="pt-PT"/>
               <a:t>Quinto nível</a:t>
             </a:r>
             <a:endParaRPr lang="en-US" dirty="0"/>
@@ -7825,7 +7825,7 @@
           <a:p>
             <a:fld id="{083BC3CC-BECB-4EB9-A7C8-85972E772A57}" type="datetimeFigureOut">
               <a:rPr lang="pt-PT" smtClean="0"/>
-              <a:t>16/05/2021</a:t>
+              <a:t>22/05/2021</a:t>
             </a:fld>
             <a:endParaRPr lang="pt-PT"/>
           </a:p>
@@ -7867,7 +7867,7 @@
           <a:p>
             <a:fld id="{8880C9D9-2477-4696-9376-C922EAD71C8B}" type="slidenum">
               <a:rPr lang="pt-PT" smtClean="0"/>
-              <a:t>‹nº›</a:t>
+              <a:t>‹#›</a:t>
             </a:fld>
             <a:endParaRPr lang="pt-PT"/>
           </a:p>
@@ -7924,7 +7924,7 @@
           <a:lstStyle/>
           <a:p>
             <a:r>
-              <a:rPr lang="pt-PT" smtClean="0"/>
+              <a:rPr lang="pt-PT"/>
               <a:t>Clique para editar o estilo</a:t>
             </a:r>
             <a:endParaRPr lang="en-US" dirty="0"/>
@@ -7997,7 +7997,7 @@
           <a:p>
             <a:pPr lvl="0"/>
             <a:r>
-              <a:rPr lang="pt-PT" smtClean="0"/>
+              <a:rPr lang="pt-PT"/>
               <a:t>Clique para editar os estilos</a:t>
             </a:r>
           </a:p>
@@ -8025,35 +8025,35 @@
           <a:p>
             <a:pPr lvl="0"/>
             <a:r>
-              <a:rPr lang="pt-PT" smtClean="0"/>
+              <a:rPr lang="pt-PT"/>
               <a:t>Clique para editar os estilos</a:t>
             </a:r>
           </a:p>
           <a:p>
             <a:pPr lvl="1"/>
             <a:r>
-              <a:rPr lang="pt-PT" smtClean="0"/>
+              <a:rPr lang="pt-PT"/>
               <a:t>Segundo nível</a:t>
             </a:r>
           </a:p>
           <a:p>
             <a:pPr lvl="2"/>
             <a:r>
-              <a:rPr lang="pt-PT" smtClean="0"/>
+              <a:rPr lang="pt-PT"/>
               <a:t>Terceiro nível</a:t>
             </a:r>
           </a:p>
           <a:p>
             <a:pPr lvl="3"/>
             <a:r>
-              <a:rPr lang="pt-PT" smtClean="0"/>
+              <a:rPr lang="pt-PT"/>
               <a:t>Quarto nível</a:t>
             </a:r>
           </a:p>
           <a:p>
             <a:pPr lvl="4"/>
             <a:r>
-              <a:rPr lang="pt-PT" smtClean="0"/>
+              <a:rPr lang="pt-PT"/>
               <a:t>Quinto nível</a:t>
             </a:r>
             <a:endParaRPr lang="en-US" dirty="0"/>
@@ -8126,7 +8126,7 @@
           <a:p>
             <a:pPr lvl="0"/>
             <a:r>
-              <a:rPr lang="pt-PT" smtClean="0"/>
+              <a:rPr lang="pt-PT"/>
               <a:t>Clique para editar os estilos</a:t>
             </a:r>
           </a:p>
@@ -8154,35 +8154,35 @@
           <a:p>
             <a:pPr lvl="0"/>
             <a:r>
-              <a:rPr lang="pt-PT" smtClean="0"/>
+              <a:rPr lang="pt-PT"/>
               <a:t>Clique para editar os estilos</a:t>
             </a:r>
           </a:p>
           <a:p>
             <a:pPr lvl="1"/>
             <a:r>
-              <a:rPr lang="pt-PT" smtClean="0"/>
+              <a:rPr lang="pt-PT"/>
               <a:t>Segundo nível</a:t>
             </a:r>
           </a:p>
           <a:p>
             <a:pPr lvl="2"/>
             <a:r>
-              <a:rPr lang="pt-PT" smtClean="0"/>
+              <a:rPr lang="pt-PT"/>
               <a:t>Terceiro nível</a:t>
             </a:r>
           </a:p>
           <a:p>
             <a:pPr lvl="3"/>
             <a:r>
-              <a:rPr lang="pt-PT" smtClean="0"/>
+              <a:rPr lang="pt-PT"/>
               <a:t>Quarto nível</a:t>
             </a:r>
           </a:p>
           <a:p>
             <a:pPr lvl="4"/>
             <a:r>
-              <a:rPr lang="pt-PT" smtClean="0"/>
+              <a:rPr lang="pt-PT"/>
               <a:t>Quinto nível</a:t>
             </a:r>
             <a:endParaRPr lang="en-US" dirty="0"/>
@@ -8206,7 +8206,7 @@
           <a:p>
             <a:fld id="{083BC3CC-BECB-4EB9-A7C8-85972E772A57}" type="datetimeFigureOut">
               <a:rPr lang="pt-PT" smtClean="0"/>
-              <a:t>16/05/2021</a:t>
+              <a:t>22/05/2021</a:t>
             </a:fld>
             <a:endParaRPr lang="pt-PT"/>
           </a:p>
@@ -8248,7 +8248,7 @@
           <a:p>
             <a:fld id="{8880C9D9-2477-4696-9376-C922EAD71C8B}" type="slidenum">
               <a:rPr lang="pt-PT" smtClean="0"/>
-              <a:t>‹nº›</a:t>
+              <a:t>‹#›</a:t>
             </a:fld>
             <a:endParaRPr lang="pt-PT"/>
           </a:p>
@@ -8300,7 +8300,7 @@
           <a:lstStyle/>
           <a:p>
             <a:r>
-              <a:rPr lang="pt-PT" smtClean="0"/>
+              <a:rPr lang="pt-PT"/>
               <a:t>Clique para editar o estilo</a:t>
             </a:r>
             <a:endParaRPr lang="en-US" dirty="0"/>
@@ -8324,7 +8324,7 @@
           <a:p>
             <a:fld id="{083BC3CC-BECB-4EB9-A7C8-85972E772A57}" type="datetimeFigureOut">
               <a:rPr lang="pt-PT" smtClean="0"/>
-              <a:t>16/05/2021</a:t>
+              <a:t>22/05/2021</a:t>
             </a:fld>
             <a:endParaRPr lang="pt-PT"/>
           </a:p>
@@ -8366,7 +8366,7 @@
           <a:p>
             <a:fld id="{8880C9D9-2477-4696-9376-C922EAD71C8B}" type="slidenum">
               <a:rPr lang="pt-PT" smtClean="0"/>
-              <a:t>‹nº›</a:t>
+              <a:t>‹#›</a:t>
             </a:fld>
             <a:endParaRPr lang="pt-PT"/>
           </a:p>
@@ -8419,7 +8419,7 @@
           <a:p>
             <a:fld id="{083BC3CC-BECB-4EB9-A7C8-85972E772A57}" type="datetimeFigureOut">
               <a:rPr lang="pt-PT" smtClean="0"/>
-              <a:t>16/05/2021</a:t>
+              <a:t>22/05/2021</a:t>
             </a:fld>
             <a:endParaRPr lang="pt-PT"/>
           </a:p>
@@ -8461,7 +8461,7 @@
           <a:p>
             <a:fld id="{8880C9D9-2477-4696-9376-C922EAD71C8B}" type="slidenum">
               <a:rPr lang="pt-PT" smtClean="0"/>
-              <a:t>‹nº›</a:t>
+              <a:t>‹#›</a:t>
             </a:fld>
             <a:endParaRPr lang="pt-PT"/>
           </a:p>
@@ -8522,7 +8522,7 @@
           </a:lstStyle>
           <a:p>
             <a:r>
-              <a:rPr lang="pt-PT" smtClean="0"/>
+              <a:rPr lang="pt-PT"/>
               <a:t>Clique para editar o estilo</a:t>
             </a:r>
             <a:endParaRPr lang="en-US" dirty="0"/>
@@ -8551,35 +8551,35 @@
           <a:p>
             <a:pPr lvl="0"/>
             <a:r>
-              <a:rPr lang="pt-PT" smtClean="0"/>
+              <a:rPr lang="pt-PT"/>
               <a:t>Clique para editar os estilos</a:t>
             </a:r>
           </a:p>
           <a:p>
             <a:pPr lvl="1"/>
             <a:r>
-              <a:rPr lang="pt-PT" smtClean="0"/>
+              <a:rPr lang="pt-PT"/>
               <a:t>Segundo nível</a:t>
             </a:r>
           </a:p>
           <a:p>
             <a:pPr lvl="2"/>
             <a:r>
-              <a:rPr lang="pt-PT" smtClean="0"/>
+              <a:rPr lang="pt-PT"/>
               <a:t>Terceiro nível</a:t>
             </a:r>
           </a:p>
           <a:p>
             <a:pPr lvl="3"/>
             <a:r>
-              <a:rPr lang="pt-PT" smtClean="0"/>
+              <a:rPr lang="pt-PT"/>
               <a:t>Quarto nível</a:t>
             </a:r>
           </a:p>
           <a:p>
             <a:pPr lvl="4"/>
             <a:r>
-              <a:rPr lang="pt-PT" smtClean="0"/>
+              <a:rPr lang="pt-PT"/>
               <a:t>Quinto nível</a:t>
             </a:r>
             <a:endParaRPr lang="en-US" dirty="0"/>
@@ -8645,7 +8645,7 @@
           <a:p>
             <a:pPr lvl="0"/>
             <a:r>
-              <a:rPr lang="pt-PT" smtClean="0"/>
+              <a:rPr lang="pt-PT"/>
               <a:t>Clique para editar os estilos</a:t>
             </a:r>
           </a:p>
@@ -8668,7 +8668,7 @@
           <a:p>
             <a:fld id="{083BC3CC-BECB-4EB9-A7C8-85972E772A57}" type="datetimeFigureOut">
               <a:rPr lang="pt-PT" smtClean="0"/>
-              <a:t>16/05/2021</a:t>
+              <a:t>22/05/2021</a:t>
             </a:fld>
             <a:endParaRPr lang="pt-PT"/>
           </a:p>
@@ -8710,7 +8710,7 @@
           <a:p>
             <a:fld id="{8880C9D9-2477-4696-9376-C922EAD71C8B}" type="slidenum">
               <a:rPr lang="pt-PT" smtClean="0"/>
-              <a:t>‹nº›</a:t>
+              <a:t>‹#›</a:t>
             </a:fld>
             <a:endParaRPr lang="pt-PT"/>
           </a:p>
@@ -8771,7 +8771,7 @@
           </a:lstStyle>
           <a:p>
             <a:r>
-              <a:rPr lang="pt-PT" smtClean="0"/>
+              <a:rPr lang="pt-PT"/>
               <a:t>Clique para editar o estilo</a:t>
             </a:r>
             <a:endParaRPr lang="en-US" dirty="0"/>
@@ -8859,7 +8859,7 @@
           </a:lstStyle>
           <a:p>
             <a:r>
-              <a:rPr lang="pt-PT" smtClean="0"/>
+              <a:rPr lang="pt-PT"/>
               <a:t>Clique no ícone para adicionar uma imagem</a:t>
             </a:r>
             <a:endParaRPr lang="en-US" dirty="0"/>
@@ -8925,7 +8925,7 @@
           <a:p>
             <a:pPr lvl="0"/>
             <a:r>
-              <a:rPr lang="pt-PT" smtClean="0"/>
+              <a:rPr lang="pt-PT"/>
               <a:t>Clique para editar os estilos</a:t>
             </a:r>
           </a:p>
@@ -8948,7 +8948,7 @@
           <a:p>
             <a:fld id="{083BC3CC-BECB-4EB9-A7C8-85972E772A57}" type="datetimeFigureOut">
               <a:rPr lang="pt-PT" smtClean="0"/>
-              <a:t>16/05/2021</a:t>
+              <a:t>22/05/2021</a:t>
             </a:fld>
             <a:endParaRPr lang="pt-PT"/>
           </a:p>
@@ -8990,7 +8990,7 @@
           <a:p>
             <a:fld id="{8880C9D9-2477-4696-9376-C922EAD71C8B}" type="slidenum">
               <a:rPr lang="pt-PT" smtClean="0"/>
-              <a:t>‹nº›</a:t>
+              <a:t>‹#›</a:t>
             </a:fld>
             <a:endParaRPr lang="pt-PT"/>
           </a:p>
@@ -9064,7 +9064,7 @@
           <a:noFill/>
           <a:extLst>
             <a:ext uri="{909E8E84-426E-40dd-AFC4-6F175D3DCCD1}">
-              <a14:hiddenFill xmlns="" xmlns:a14="http://schemas.microsoft.com/office/drawing/2010/main">
+              <a14:hiddenFill xmlns:a14="http://schemas.microsoft.com/office/drawing/2010/main" xmlns="">
                 <a:solidFill>
                   <a:srgbClr val="FFFFFF"/>
                 </a:solidFill>
@@ -9138,7 +9138,7 @@
               </a:ln>
               <a:extLst>
                 <a:ext uri="{91240B29-F687-4f45-9708-019B960494DF}">
-                  <a14:hiddenLine xmlns="" xmlns:a14="http://schemas.microsoft.com/office/drawing/2010/main" w="9525">
+                  <a14:hiddenLine xmlns:a14="http://schemas.microsoft.com/office/drawing/2010/main" xmlns="" w="9525">
                     <a:solidFill>
                       <a:srgbClr val="000000"/>
                     </a:solidFill>
@@ -9228,7 +9228,7 @@
               </a:ln>
               <a:extLst>
                 <a:ext uri="{91240B29-F687-4f45-9708-019B960494DF}">
-                  <a14:hiddenLine xmlns="" xmlns:a14="http://schemas.microsoft.com/office/drawing/2010/main" w="9525">
+                  <a14:hiddenLine xmlns:a14="http://schemas.microsoft.com/office/drawing/2010/main" xmlns="" w="9525">
                     <a:solidFill>
                       <a:srgbClr val="000000"/>
                     </a:solidFill>
@@ -9318,7 +9318,7 @@
               </a:ln>
               <a:extLst>
                 <a:ext uri="{91240B29-F687-4f45-9708-019B960494DF}">
-                  <a14:hiddenLine xmlns="" xmlns:a14="http://schemas.microsoft.com/office/drawing/2010/main" w="9525">
+                  <a14:hiddenLine xmlns:a14="http://schemas.microsoft.com/office/drawing/2010/main" xmlns="" w="9525">
                     <a:solidFill>
                       <a:srgbClr val="000000"/>
                     </a:solidFill>
@@ -9380,7 +9380,7 @@
               </a:ln>
               <a:extLst>
                 <a:ext uri="{91240B29-F687-4f45-9708-019B960494DF}">
-                  <a14:hiddenLine xmlns="" xmlns:a14="http://schemas.microsoft.com/office/drawing/2010/main" w="9525">
+                  <a14:hiddenLine xmlns:a14="http://schemas.microsoft.com/office/drawing/2010/main" xmlns="" w="9525">
                     <a:solidFill>
                       <a:srgbClr val="000000"/>
                     </a:solidFill>
@@ -9470,7 +9470,7 @@
               </a:ln>
               <a:extLst>
                 <a:ext uri="{91240B29-F687-4f45-9708-019B960494DF}">
-                  <a14:hiddenLine xmlns="" xmlns:a14="http://schemas.microsoft.com/office/drawing/2010/main" w="9525">
+                  <a14:hiddenLine xmlns:a14="http://schemas.microsoft.com/office/drawing/2010/main" xmlns="" w="9525">
                     <a:solidFill>
                       <a:srgbClr val="000000"/>
                     </a:solidFill>
@@ -9532,7 +9532,7 @@
               </a:ln>
               <a:extLst>
                 <a:ext uri="{91240B29-F687-4f45-9708-019B960494DF}">
-                  <a14:hiddenLine xmlns="" xmlns:a14="http://schemas.microsoft.com/office/drawing/2010/main" w="9525">
+                  <a14:hiddenLine xmlns:a14="http://schemas.microsoft.com/office/drawing/2010/main" xmlns="" w="9525">
                     <a:solidFill>
                       <a:srgbClr val="000000"/>
                     </a:solidFill>
@@ -9594,7 +9594,7 @@
               </a:ln>
               <a:extLst>
                 <a:ext uri="{91240B29-F687-4f45-9708-019B960494DF}">
-                  <a14:hiddenLine xmlns="" xmlns:a14="http://schemas.microsoft.com/office/drawing/2010/main" w="9525">
+                  <a14:hiddenLine xmlns:a14="http://schemas.microsoft.com/office/drawing/2010/main" xmlns="" w="9525">
                     <a:solidFill>
                       <a:srgbClr val="000000"/>
                     </a:solidFill>
@@ -9684,7 +9684,7 @@
               </a:ln>
               <a:extLst>
                 <a:ext uri="{91240B29-F687-4f45-9708-019B960494DF}">
-                  <a14:hiddenLine xmlns="" xmlns:a14="http://schemas.microsoft.com/office/drawing/2010/main" w="9525">
+                  <a14:hiddenLine xmlns:a14="http://schemas.microsoft.com/office/drawing/2010/main" xmlns="" w="9525">
                     <a:solidFill>
                       <a:srgbClr val="000000"/>
                     </a:solidFill>
@@ -9774,7 +9774,7 @@
               </a:ln>
               <a:extLst>
                 <a:ext uri="{91240B29-F687-4f45-9708-019B960494DF}">
-                  <a14:hiddenLine xmlns="" xmlns:a14="http://schemas.microsoft.com/office/drawing/2010/main" w="9525">
+                  <a14:hiddenLine xmlns:a14="http://schemas.microsoft.com/office/drawing/2010/main" xmlns="" w="9525">
                     <a:solidFill>
                       <a:srgbClr val="000000"/>
                     </a:solidFill>
@@ -9836,7 +9836,7 @@
               </a:ln>
               <a:extLst>
                 <a:ext uri="{91240B29-F687-4f45-9708-019B960494DF}">
-                  <a14:hiddenLine xmlns="" xmlns:a14="http://schemas.microsoft.com/office/drawing/2010/main" w="9525">
+                  <a14:hiddenLine xmlns:a14="http://schemas.microsoft.com/office/drawing/2010/main" xmlns="" w="9525">
                     <a:solidFill>
                       <a:srgbClr val="000000"/>
                     </a:solidFill>
@@ -9946,7 +9946,7 @@
               </a:ln>
               <a:extLst>
                 <a:ext uri="{91240B29-F687-4f45-9708-019B960494DF}">
-                  <a14:hiddenLine xmlns="" xmlns:a14="http://schemas.microsoft.com/office/drawing/2010/main" w="9525">
+                  <a14:hiddenLine xmlns:a14="http://schemas.microsoft.com/office/drawing/2010/main" xmlns="" w="9525">
                     <a:solidFill>
                       <a:srgbClr val="000000"/>
                     </a:solidFill>
@@ -10030,7 +10030,7 @@
               </a:ln>
               <a:extLst>
                 <a:ext uri="{91240B29-F687-4f45-9708-019B960494DF}">
-                  <a14:hiddenLine xmlns="" xmlns:a14="http://schemas.microsoft.com/office/drawing/2010/main" w="9525">
+                  <a14:hiddenLine xmlns:a14="http://schemas.microsoft.com/office/drawing/2010/main" xmlns="" w="9525">
                     <a:solidFill>
                       <a:srgbClr val="000000"/>
                     </a:solidFill>
@@ -10092,7 +10092,7 @@
               </a:ln>
               <a:extLst>
                 <a:ext uri="{91240B29-F687-4f45-9708-019B960494DF}">
-                  <a14:hiddenLine xmlns="" xmlns:a14="http://schemas.microsoft.com/office/drawing/2010/main" w="9525">
+                  <a14:hiddenLine xmlns:a14="http://schemas.microsoft.com/office/drawing/2010/main" xmlns="" w="9525">
                     <a:solidFill>
                       <a:srgbClr val="000000"/>
                     </a:solidFill>
@@ -10154,7 +10154,7 @@
               </a:ln>
               <a:extLst>
                 <a:ext uri="{91240B29-F687-4f45-9708-019B960494DF}">
-                  <a14:hiddenLine xmlns="" xmlns:a14="http://schemas.microsoft.com/office/drawing/2010/main" w="9525">
+                  <a14:hiddenLine xmlns:a14="http://schemas.microsoft.com/office/drawing/2010/main" xmlns="" w="9525">
                     <a:solidFill>
                       <a:srgbClr val="000000"/>
                     </a:solidFill>
@@ -10244,7 +10244,7 @@
               </a:ln>
               <a:extLst>
                 <a:ext uri="{91240B29-F687-4f45-9708-019B960494DF}">
-                  <a14:hiddenLine xmlns="" xmlns:a14="http://schemas.microsoft.com/office/drawing/2010/main" w="9525">
+                  <a14:hiddenLine xmlns:a14="http://schemas.microsoft.com/office/drawing/2010/main" xmlns="" w="9525">
                     <a:solidFill>
                       <a:srgbClr val="000000"/>
                     </a:solidFill>
@@ -10278,7 +10278,7 @@
               </a:ln>
               <a:extLst>
                 <a:ext uri="{91240B29-F687-4f45-9708-019B960494DF}">
-                  <a14:hiddenLine xmlns="" xmlns:a14="http://schemas.microsoft.com/office/drawing/2010/main" w="9525">
+                  <a14:hiddenLine xmlns:a14="http://schemas.microsoft.com/office/drawing/2010/main" xmlns="" w="9525">
                     <a:solidFill>
                       <a:srgbClr val="000000"/>
                     </a:solidFill>
@@ -10343,7 +10343,7 @@
               </a:ln>
               <a:extLst>
                 <a:ext uri="{91240B29-F687-4f45-9708-019B960494DF}">
-                  <a14:hiddenLine xmlns="" xmlns:a14="http://schemas.microsoft.com/office/drawing/2010/main" w="9525">
+                  <a14:hiddenLine xmlns:a14="http://schemas.microsoft.com/office/drawing/2010/main" xmlns="" w="9525">
                     <a:solidFill>
                       <a:srgbClr val="000000"/>
                     </a:solidFill>
@@ -10433,7 +10433,7 @@
               </a:ln>
               <a:extLst>
                 <a:ext uri="{91240B29-F687-4f45-9708-019B960494DF}">
-                  <a14:hiddenLine xmlns="" xmlns:a14="http://schemas.microsoft.com/office/drawing/2010/main" w="9525">
+                  <a14:hiddenLine xmlns:a14="http://schemas.microsoft.com/office/drawing/2010/main" xmlns="" w="9525">
                     <a:solidFill>
                       <a:srgbClr val="000000"/>
                     </a:solidFill>
@@ -10495,7 +10495,7 @@
               </a:ln>
               <a:extLst>
                 <a:ext uri="{91240B29-F687-4f45-9708-019B960494DF}">
-                  <a14:hiddenLine xmlns="" xmlns:a14="http://schemas.microsoft.com/office/drawing/2010/main" w="9525">
+                  <a14:hiddenLine xmlns:a14="http://schemas.microsoft.com/office/drawing/2010/main" xmlns="" w="9525">
                     <a:solidFill>
                       <a:srgbClr val="000000"/>
                     </a:solidFill>
@@ -10585,7 +10585,7 @@
               </a:ln>
               <a:extLst>
                 <a:ext uri="{91240B29-F687-4f45-9708-019B960494DF}">
-                  <a14:hiddenLine xmlns="" xmlns:a14="http://schemas.microsoft.com/office/drawing/2010/main" w="9525">
+                  <a14:hiddenLine xmlns:a14="http://schemas.microsoft.com/office/drawing/2010/main" xmlns="" w="9525">
                     <a:solidFill>
                       <a:srgbClr val="000000"/>
                     </a:solidFill>
@@ -10650,7 +10650,7 @@
               </a:ln>
               <a:extLst>
                 <a:ext uri="{91240B29-F687-4f45-9708-019B960494DF}">
-                  <a14:hiddenLine xmlns="" xmlns:a14="http://schemas.microsoft.com/office/drawing/2010/main" w="9525">
+                  <a14:hiddenLine xmlns:a14="http://schemas.microsoft.com/office/drawing/2010/main" xmlns="" w="9525">
                     <a:solidFill>
                       <a:srgbClr val="000000"/>
                     </a:solidFill>
@@ -10712,7 +10712,7 @@
               </a:ln>
               <a:extLst>
                 <a:ext uri="{91240B29-F687-4f45-9708-019B960494DF}">
-                  <a14:hiddenLine xmlns="" xmlns:a14="http://schemas.microsoft.com/office/drawing/2010/main" w="9525">
+                  <a14:hiddenLine xmlns:a14="http://schemas.microsoft.com/office/drawing/2010/main" xmlns="" w="9525">
                     <a:solidFill>
                       <a:srgbClr val="000000"/>
                     </a:solidFill>
@@ -10802,7 +10802,7 @@
               </a:ln>
               <a:extLst>
                 <a:ext uri="{91240B29-F687-4f45-9708-019B960494DF}">
-                  <a14:hiddenLine xmlns="" xmlns:a14="http://schemas.microsoft.com/office/drawing/2010/main" w="9525">
+                  <a14:hiddenLine xmlns:a14="http://schemas.microsoft.com/office/drawing/2010/main" xmlns="" w="9525">
                     <a:solidFill>
                       <a:srgbClr val="000000"/>
                     </a:solidFill>
@@ -10892,7 +10892,7 @@
               </a:ln>
               <a:extLst>
                 <a:ext uri="{91240B29-F687-4f45-9708-019B960494DF}">
-                  <a14:hiddenLine xmlns="" xmlns:a14="http://schemas.microsoft.com/office/drawing/2010/main" w="9525">
+                  <a14:hiddenLine xmlns:a14="http://schemas.microsoft.com/office/drawing/2010/main" xmlns="" w="9525">
                     <a:solidFill>
                       <a:srgbClr val="000000"/>
                     </a:solidFill>
@@ -10957,7 +10957,7 @@
               </a:ln>
               <a:extLst>
                 <a:ext uri="{91240B29-F687-4f45-9708-019B960494DF}">
-                  <a14:hiddenLine xmlns="" xmlns:a14="http://schemas.microsoft.com/office/drawing/2010/main" w="9525">
+                  <a14:hiddenLine xmlns:a14="http://schemas.microsoft.com/office/drawing/2010/main" xmlns="" w="9525">
                     <a:solidFill>
                       <a:srgbClr val="000000"/>
                     </a:solidFill>
@@ -11077,7 +11077,7 @@
               </a:ln>
               <a:extLst>
                 <a:ext uri="{91240B29-F687-4f45-9708-019B960494DF}">
-                  <a14:hiddenLine xmlns="" xmlns:a14="http://schemas.microsoft.com/office/drawing/2010/main" w="9525">
+                  <a14:hiddenLine xmlns:a14="http://schemas.microsoft.com/office/drawing/2010/main" xmlns="" w="9525">
                     <a:solidFill>
                       <a:srgbClr val="000000"/>
                     </a:solidFill>
@@ -11175,7 +11175,7 @@
               </a:ln>
               <a:extLst>
                 <a:ext uri="{91240B29-F687-4f45-9708-019B960494DF}">
-                  <a14:hiddenLine xmlns="" xmlns:a14="http://schemas.microsoft.com/office/drawing/2010/main" w="9525">
+                  <a14:hiddenLine xmlns:a14="http://schemas.microsoft.com/office/drawing/2010/main" xmlns="" w="9525">
                     <a:solidFill>
                       <a:srgbClr val="000000"/>
                     </a:solidFill>
@@ -11290,7 +11290,7 @@
               </a:ln>
               <a:extLst>
                 <a:ext uri="{91240B29-F687-4f45-9708-019B960494DF}">
-                  <a14:hiddenLine xmlns="" xmlns:a14="http://schemas.microsoft.com/office/drawing/2010/main" w="9525">
+                  <a14:hiddenLine xmlns:a14="http://schemas.microsoft.com/office/drawing/2010/main" xmlns="" w="9525">
                     <a:solidFill>
                       <a:srgbClr val="000000"/>
                     </a:solidFill>
@@ -11380,7 +11380,7 @@
               </a:ln>
               <a:extLst>
                 <a:ext uri="{91240B29-F687-4f45-9708-019B960494DF}">
-                  <a14:hiddenLine xmlns="" xmlns:a14="http://schemas.microsoft.com/office/drawing/2010/main" w="9525">
+                  <a14:hiddenLine xmlns:a14="http://schemas.microsoft.com/office/drawing/2010/main" xmlns="" w="9525">
                     <a:solidFill>
                       <a:srgbClr val="000000"/>
                     </a:solidFill>
@@ -11445,7 +11445,7 @@
               </a:ln>
               <a:extLst>
                 <a:ext uri="{91240B29-F687-4f45-9708-019B960494DF}">
-                  <a14:hiddenLine xmlns="" xmlns:a14="http://schemas.microsoft.com/office/drawing/2010/main" w="9525">
+                  <a14:hiddenLine xmlns:a14="http://schemas.microsoft.com/office/drawing/2010/main" xmlns="" w="9525">
                     <a:solidFill>
                       <a:srgbClr val="000000"/>
                     </a:solidFill>
@@ -11535,7 +11535,7 @@
               </a:ln>
               <a:extLst>
                 <a:ext uri="{91240B29-F687-4f45-9708-019B960494DF}">
-                  <a14:hiddenLine xmlns="" xmlns:a14="http://schemas.microsoft.com/office/drawing/2010/main" w="9525">
+                  <a14:hiddenLine xmlns:a14="http://schemas.microsoft.com/office/drawing/2010/main" xmlns="" w="9525">
                     <a:solidFill>
                       <a:srgbClr val="000000"/>
                     </a:solidFill>
@@ -11603,7 +11603,7 @@
               </a:ln>
               <a:extLst>
                 <a:ext uri="{91240B29-F687-4f45-9708-019B960494DF}">
-                  <a14:hiddenLine xmlns="" xmlns:a14="http://schemas.microsoft.com/office/drawing/2010/main" w="9525">
+                  <a14:hiddenLine xmlns:a14="http://schemas.microsoft.com/office/drawing/2010/main" xmlns="" w="9525">
                     <a:solidFill>
                       <a:srgbClr val="000000"/>
                     </a:solidFill>
@@ -11693,7 +11693,7 @@
               </a:ln>
               <a:extLst>
                 <a:ext uri="{91240B29-F687-4f45-9708-019B960494DF}">
-                  <a14:hiddenLine xmlns="" xmlns:a14="http://schemas.microsoft.com/office/drawing/2010/main" w="9525">
+                  <a14:hiddenLine xmlns:a14="http://schemas.microsoft.com/office/drawing/2010/main" xmlns="" w="9525">
                     <a:solidFill>
                       <a:srgbClr val="000000"/>
                     </a:solidFill>
@@ -11761,7 +11761,7 @@
               </a:ln>
               <a:extLst>
                 <a:ext uri="{91240B29-F687-4f45-9708-019B960494DF}">
-                  <a14:hiddenLine xmlns="" xmlns:a14="http://schemas.microsoft.com/office/drawing/2010/main" w="9525">
+                  <a14:hiddenLine xmlns:a14="http://schemas.microsoft.com/office/drawing/2010/main" xmlns="" w="9525">
                     <a:solidFill>
                       <a:srgbClr val="000000"/>
                     </a:solidFill>
@@ -11851,7 +11851,7 @@
               </a:ln>
               <a:extLst>
                 <a:ext uri="{91240B29-F687-4f45-9708-019B960494DF}">
-                  <a14:hiddenLine xmlns="" xmlns:a14="http://schemas.microsoft.com/office/drawing/2010/main" w="9525">
+                  <a14:hiddenLine xmlns:a14="http://schemas.microsoft.com/office/drawing/2010/main" xmlns="" w="9525">
                     <a:solidFill>
                       <a:srgbClr val="000000"/>
                     </a:solidFill>
@@ -11885,7 +11885,7 @@
               </a:ln>
               <a:extLst>
                 <a:ext uri="{91240B29-F687-4f45-9708-019B960494DF}">
-                  <a14:hiddenLine xmlns="" xmlns:a14="http://schemas.microsoft.com/office/drawing/2010/main" w="9525">
+                  <a14:hiddenLine xmlns:a14="http://schemas.microsoft.com/office/drawing/2010/main" xmlns="" w="9525">
                     <a:solidFill>
                       <a:srgbClr val="000000"/>
                     </a:solidFill>
@@ -11955,35 +11955,35 @@
           <a:p>
             <a:pPr lvl="0"/>
             <a:r>
-              <a:rPr lang="pt-PT" smtClean="0"/>
+              <a:rPr lang="pt-PT"/>
               <a:t>Clique para editar os estilos</a:t>
             </a:r>
           </a:p>
           <a:p>
             <a:pPr lvl="1"/>
             <a:r>
-              <a:rPr lang="pt-PT" smtClean="0"/>
+              <a:rPr lang="pt-PT"/>
               <a:t>Segundo nível</a:t>
             </a:r>
           </a:p>
           <a:p>
             <a:pPr lvl="2"/>
             <a:r>
-              <a:rPr lang="pt-PT" smtClean="0"/>
+              <a:rPr lang="pt-PT"/>
               <a:t>Terceiro nível</a:t>
             </a:r>
           </a:p>
           <a:p>
             <a:pPr lvl="3"/>
             <a:r>
-              <a:rPr lang="pt-PT" smtClean="0"/>
+              <a:rPr lang="pt-PT"/>
               <a:t>Quarto nível</a:t>
             </a:r>
           </a:p>
           <a:p>
             <a:pPr lvl="4"/>
             <a:r>
-              <a:rPr lang="pt-PT" smtClean="0"/>
+              <a:rPr lang="pt-PT"/>
               <a:t>Quinto nível</a:t>
             </a:r>
             <a:endParaRPr lang="en-US" dirty="0"/>
@@ -12025,7 +12025,7 @@
           <a:p>
             <a:fld id="{083BC3CC-BECB-4EB9-A7C8-85972E772A57}" type="datetimeFigureOut">
               <a:rPr lang="pt-PT" smtClean="0"/>
-              <a:t>16/05/2021</a:t>
+              <a:t>22/05/2021</a:t>
             </a:fld>
             <a:endParaRPr lang="pt-PT"/>
           </a:p>
@@ -12103,7 +12103,7 @@
           <a:p>
             <a:fld id="{8880C9D9-2477-4696-9376-C922EAD71C8B}" type="slidenum">
               <a:rPr lang="pt-PT" smtClean="0"/>
-              <a:t>‹nº›</a:t>
+              <a:t>‹#›</a:t>
             </a:fld>
             <a:endParaRPr lang="pt-PT"/>
           </a:p>
@@ -12496,13 +12496,6 @@
   <p:clrMapOvr>
     <a:masterClrMapping/>
   </p:clrMapOvr>
-  <p:timing>
-    <p:tnLst>
-      <p:par>
-        <p:cTn id="1" dur="indefinite" restart="never" nodeType="tmRoot"/>
-      </p:par>
-    </p:tnLst>
-  </p:timing>
 </p:sld>
 </file>
 
@@ -12575,10 +12568,9 @@
           <a:p>
             <a:pPr algn="ctr"/>
             <a:r>
-              <a:rPr lang="pt-PT" dirty="0" smtClean="0"/>
+              <a:rPr lang="pt-PT" dirty="0"/>
               <a:t>Perguntas</a:t>
             </a:r>
-            <a:endParaRPr lang="pt-PT" dirty="0"/>
           </a:p>
         </p:txBody>
       </p:sp>
@@ -12592,13 +12584,6 @@
   <p:clrMapOvr>
     <a:masterClrMapping/>
   </p:clrMapOvr>
-  <p:timing>
-    <p:tnLst>
-      <p:par>
-        <p:cTn id="1" dur="indefinite" restart="never" nodeType="tmRoot"/>
-      </p:par>
-    </p:tnLst>
-  </p:timing>
 </p:sld>
 </file>
 
@@ -12641,10 +12626,9 @@
           <a:p>
             <a:pPr algn="ctr"/>
             <a:r>
-              <a:rPr lang="pt-PT" dirty="0" smtClean="0"/>
+              <a:rPr lang="pt-PT" dirty="0"/>
               <a:t>O que é o Projeto ?</a:t>
             </a:r>
-            <a:endParaRPr lang="pt-PT" dirty="0"/>
           </a:p>
         </p:txBody>
       </p:sp>
@@ -12665,26 +12649,27 @@
           </a:xfrm>
         </p:spPr>
         <p:txBody>
-          <a:bodyPr/>
+          <a:bodyPr>
+            <a:normAutofit fontScale="92500"/>
+          </a:bodyPr>
           <a:lstStyle/>
           <a:p>
             <a:r>
-              <a:rPr lang="pt-PT" dirty="0" smtClean="0"/>
+              <a:rPr lang="pt-PT" dirty="0"/>
               <a:t>Este projeto trata-se de uma aplicação mobile de medição de redes 5G.</a:t>
             </a:r>
           </a:p>
           <a:p>
             <a:r>
-              <a:rPr lang="pt-PT" dirty="0" smtClean="0"/>
+              <a:rPr lang="pt-PT" dirty="0"/>
               <a:t>Esta aplicação foi pensada como forma de complemento a um sistema já existente desenvolvido por integrantes do ISEL. O mesmo continha apenas equipamentos grandes e de pouca mobilidade, normalmente instalados em veículos.</a:t>
             </a:r>
           </a:p>
           <a:p>
             <a:r>
-              <a:rPr lang="pt-PT" dirty="0" smtClean="0"/>
-              <a:t>Embora o dispositivo móvel não seja tão completo irá oferecer mais mobilidade e conseguirá ajudar na recolha de alguma informação.</a:t>
-            </a:r>
-            <a:endParaRPr lang="pt-PT" dirty="0"/>
+              <a:rPr lang="pt-PT" dirty="0"/>
+              <a:t>Embora o dispositivo móvel não seja tão completo quanto os seus predecessores, irá oferecer mais mobilidade e conseguirá ajudar na recolha de alguma informação.</a:t>
+            </a:r>
           </a:p>
         </p:txBody>
       </p:sp>
@@ -12704,7 +12689,7 @@
         </p:blipFill>
         <p:spPr>
           <a:xfrm>
-            <a:off x="4517208" y="4928287"/>
+            <a:off x="4517208" y="4559318"/>
             <a:ext cx="3154407" cy="1795586"/>
           </a:xfrm>
           <a:prstGeom prst="rect">
@@ -12722,13 +12707,6 @@
   <p:clrMapOvr>
     <a:masterClrMapping/>
   </p:clrMapOvr>
-  <p:timing>
-    <p:tnLst>
-      <p:par>
-        <p:cTn id="1" dur="indefinite" restart="never" nodeType="tmRoot"/>
-      </p:par>
-    </p:tnLst>
-  </p:timing>
 </p:sld>
 </file>
 
@@ -12771,10 +12749,9 @@
           <a:p>
             <a:pPr algn="ctr"/>
             <a:r>
-              <a:rPr lang="pt-PT" dirty="0" smtClean="0"/>
+              <a:rPr lang="pt-PT" dirty="0"/>
               <a:t>Finalidade</a:t>
             </a:r>
-            <a:endParaRPr lang="pt-PT" dirty="0"/>
           </a:p>
         </p:txBody>
       </p:sp>
@@ -12796,85 +12773,89 @@
         </p:spPr>
         <p:txBody>
           <a:bodyPr>
-            <a:normAutofit lnSpcReduction="10000"/>
+            <a:normAutofit fontScale="92500"/>
           </a:bodyPr>
           <a:lstStyle/>
           <a:p>
+            <a:pPr marL="0" indent="0">
+              <a:buNone/>
+            </a:pPr>
             <a:r>
               <a:rPr lang="pt-PT" dirty="0"/>
-              <a:t>A aplicação tem como objetivo a recolha de parâmetros rádio, cobertura da internet e localização do dispositivo</a:t>
-            </a:r>
-            <a:r>
-              <a:rPr lang="pt-PT" dirty="0" smtClean="0"/>
+              <a:t>A aplicação tem como objetivos:</a:t>
+            </a:r>
+          </a:p>
+          <a:p>
+            <a:r>
+              <a:rPr lang="pt-PT" dirty="0"/>
+              <a:t>Recolha de parâmetros rádio, cobertura da internet e localização do dispositivo.</a:t>
+            </a:r>
+          </a:p>
+          <a:p>
+            <a:r>
+              <a:rPr lang="pt-PT" dirty="0"/>
+              <a:t>Notificar a </a:t>
+            </a:r>
+            <a:r>
+              <a:rPr lang="pt-PT" i="1" dirty="0"/>
+              <a:t>API</a:t>
+            </a:r>
+            <a:r>
+              <a:rPr lang="pt-PT" dirty="0"/>
+              <a:t> disponibilizada da recolha realizada.</a:t>
+            </a:r>
+          </a:p>
+          <a:p>
+            <a:r>
+              <a:rPr lang="pt-PT" dirty="0"/>
+              <a:t>Possibilidade de realizar testes conforme o que a </a:t>
+            </a:r>
+            <a:r>
+              <a:rPr lang="pt-PT" i="1" dirty="0"/>
+              <a:t>API</a:t>
+            </a:r>
+            <a:r>
+              <a:rPr lang="pt-PT" dirty="0"/>
+              <a:t> precisa.</a:t>
+            </a:r>
+          </a:p>
+          <a:p>
+            <a:r>
+              <a:rPr lang="pt-PT" dirty="0"/>
+              <a:t>Dependendo do tempo de implementação poderão ser implementados mais requisitos como o </a:t>
+            </a:r>
+            <a:r>
+              <a:rPr lang="pt-PT" i="1" dirty="0" err="1"/>
+              <a:t>ping</a:t>
+            </a:r>
+            <a:r>
+              <a:rPr lang="pt-PT" dirty="0"/>
+              <a:t>, troca de ficheiros via </a:t>
+            </a:r>
+            <a:r>
+              <a:rPr lang="pt-PT" i="1" dirty="0"/>
+              <a:t>FTP</a:t>
+            </a:r>
+            <a:r>
+              <a:rPr lang="pt-PT" dirty="0"/>
+              <a:t> e cálculo da velocidade de </a:t>
+            </a:r>
+            <a:r>
+              <a:rPr lang="pt-PT" i="1" dirty="0"/>
+              <a:t>upload</a:t>
+            </a:r>
+            <a:r>
+              <a:rPr lang="pt-PT" dirty="0"/>
+              <a:t> e </a:t>
+            </a:r>
+            <a:r>
+              <a:rPr lang="pt-PT" i="1" dirty="0"/>
+              <a:t>download</a:t>
+            </a:r>
+            <a:r>
+              <a:rPr lang="pt-PT" dirty="0"/>
               <a:t>.</a:t>
             </a:r>
-          </a:p>
-          <a:p>
-            <a:r>
-              <a:rPr lang="pt-PT" dirty="0" smtClean="0"/>
-              <a:t>Notificar a </a:t>
-            </a:r>
-            <a:r>
-              <a:rPr lang="pt-PT" i="1" dirty="0" smtClean="0"/>
-              <a:t>API</a:t>
-            </a:r>
-            <a:r>
-              <a:rPr lang="pt-PT" dirty="0" smtClean="0"/>
-              <a:t> disponibilizada da recolha realizada.</a:t>
-            </a:r>
-          </a:p>
-          <a:p>
-            <a:r>
-              <a:rPr lang="pt-PT" dirty="0" smtClean="0"/>
-              <a:t>Possibilidade de realizar testes conforme o que a </a:t>
-            </a:r>
-            <a:r>
-              <a:rPr lang="pt-PT" i="1" dirty="0" smtClean="0"/>
-              <a:t>API</a:t>
-            </a:r>
-            <a:r>
-              <a:rPr lang="pt-PT" dirty="0" smtClean="0"/>
-              <a:t> precisa.</a:t>
-            </a:r>
-          </a:p>
-          <a:p>
-            <a:r>
-              <a:rPr lang="pt-PT" dirty="0" smtClean="0"/>
-              <a:t>Dependendo do tempo de implementação poderão ser implementados mais requisitos como o </a:t>
-            </a:r>
-            <a:r>
-              <a:rPr lang="pt-PT" i="1" dirty="0" err="1" smtClean="0"/>
-              <a:t>ping</a:t>
-            </a:r>
-            <a:r>
-              <a:rPr lang="pt-PT" dirty="0" smtClean="0"/>
-              <a:t>, troca de ficheiros via </a:t>
-            </a:r>
-            <a:r>
-              <a:rPr lang="pt-PT" i="1" dirty="0" smtClean="0"/>
-              <a:t>FTP</a:t>
-            </a:r>
-            <a:r>
-              <a:rPr lang="pt-PT" dirty="0" smtClean="0"/>
-              <a:t> e cálculo da velocidade de </a:t>
-            </a:r>
-            <a:r>
-              <a:rPr lang="pt-PT" i="1" dirty="0" smtClean="0"/>
-              <a:t>upload</a:t>
-            </a:r>
-            <a:r>
-              <a:rPr lang="pt-PT" dirty="0" smtClean="0"/>
-              <a:t> e </a:t>
-            </a:r>
-            <a:r>
-              <a:rPr lang="pt-PT" i="1" dirty="0" smtClean="0"/>
-              <a:t>download</a:t>
-            </a:r>
-            <a:r>
-              <a:rPr lang="pt-PT" dirty="0" smtClean="0"/>
-              <a:t>.</a:t>
-            </a:r>
-            <a:endParaRPr lang="pt-PT" dirty="0"/>
           </a:p>
           <a:p>
             <a:endParaRPr lang="pt-PT" dirty="0"/>
@@ -12891,13 +12872,6 @@
   <p:clrMapOvr>
     <a:masterClrMapping/>
   </p:clrMapOvr>
-  <p:timing>
-    <p:tnLst>
-      <p:par>
-        <p:cTn id="1" dur="indefinite" restart="never" nodeType="tmRoot"/>
-      </p:par>
-    </p:tnLst>
-  </p:timing>
 </p:sld>
 </file>
 
@@ -12940,10 +12914,9 @@
           <a:p>
             <a:pPr algn="ctr"/>
             <a:r>
-              <a:rPr lang="pt-PT" dirty="0" smtClean="0"/>
+              <a:rPr lang="pt-PT" dirty="0"/>
               <a:t>Visão Geral Solução</a:t>
             </a:r>
-            <a:endParaRPr lang="pt-PT" dirty="0"/>
           </a:p>
         </p:txBody>
       </p:sp>
@@ -12971,7 +12944,7 @@
           <a:p>
             <a:r>
               <a:rPr lang="pt-PT" dirty="0"/>
-              <a:t>Presentemente a solução desenvolvida contem 3 componentes.</a:t>
+              <a:t>Presentemente a solução desenvolvida contém 3 componentes.</a:t>
             </a:r>
           </a:p>
           <a:p>
@@ -12982,15 +12955,7 @@
             </a:r>
             <a:r>
               <a:rPr lang="pt-PT" dirty="0"/>
-              <a:t>(OBU) – Sonda instalada em veículos com o objetivo de gerar tráfego </a:t>
-            </a:r>
-            <a:r>
-              <a:rPr lang="pt-PT" dirty="0" smtClean="0"/>
-              <a:t>de forma a recolher </a:t>
-            </a:r>
-            <a:r>
-              <a:rPr lang="pt-PT" dirty="0"/>
-              <a:t>medições em diferentes pontos.</a:t>
+              <a:t>(OBU) – Sonda instalada em veículos com o objetivo de gerar tráfego de forma a recolher medições em diferentes pontos do mapa de uma área.</a:t>
             </a:r>
           </a:p>
           <a:p>
@@ -13001,40 +12966,35 @@
             </a:r>
             <a:r>
               <a:rPr lang="pt-PT" dirty="0"/>
-              <a:t>(FSU) – </a:t>
-            </a:r>
-            <a:r>
-              <a:rPr lang="pt-PT" dirty="0" smtClean="0"/>
-              <a:t>Software instalado em servidores espalhados por Portugal e Espanha. Este componente tem como objetivo gerar tráfego e recolher os resultados da qualidade da internet, </a:t>
-            </a:r>
-            <a:r>
-              <a:rPr lang="pt-PT" i="1" dirty="0" smtClean="0"/>
+              <a:t>(FSU) – Software instalado em servidores espalhados por Portugal e Espanha. Este componente tem como objetivo gerar tráfego e recolher os resultados da qualidade da internet, </a:t>
+            </a:r>
+            <a:r>
+              <a:rPr lang="pt-PT" i="1" dirty="0"/>
               <a:t>download</a:t>
             </a:r>
             <a:r>
-              <a:rPr lang="pt-PT" dirty="0" smtClean="0"/>
+              <a:rPr lang="pt-PT" dirty="0"/>
               <a:t> e </a:t>
             </a:r>
             <a:r>
-              <a:rPr lang="pt-PT" i="1" dirty="0" smtClean="0"/>
+              <a:rPr lang="pt-PT" i="1" dirty="0"/>
               <a:t>upload</a:t>
             </a:r>
             <a:r>
-              <a:rPr lang="pt-PT" dirty="0" smtClean="0"/>
+              <a:rPr lang="pt-PT" dirty="0"/>
               <a:t>.</a:t>
             </a:r>
           </a:p>
           <a:p>
             <a:pPr lvl="1"/>
             <a:r>
-              <a:rPr lang="pt-PT" i="1" dirty="0" smtClean="0"/>
+              <a:rPr lang="pt-PT" i="1" dirty="0"/>
               <a:t>Management System </a:t>
             </a:r>
             <a:r>
-              <a:rPr lang="pt-PT" dirty="0" smtClean="0"/>
+              <a:rPr lang="pt-PT" dirty="0"/>
               <a:t>– Sistema responsável por receber, processar e disponibilizar toda a informação recolhida dos componentes anteriores durante os testes.</a:t>
             </a:r>
-            <a:endParaRPr lang="pt-PT" dirty="0"/>
           </a:p>
         </p:txBody>
       </p:sp>
@@ -13072,13 +13032,6 @@
   <p:clrMapOvr>
     <a:masterClrMapping/>
   </p:clrMapOvr>
-  <p:timing>
-    <p:tnLst>
-      <p:par>
-        <p:cTn id="1" dur="indefinite" restart="never" nodeType="tmRoot"/>
-      </p:par>
-    </p:tnLst>
-  </p:timing>
 </p:sld>
 </file>
 
@@ -13101,6 +13054,79 @@
       </p:grpSpPr>
       <p:sp>
         <p:nvSpPr>
+          <p:cNvPr id="7" name="TextBox 6">
+            <a:extLst>
+              <a:ext uri="{FF2B5EF4-FFF2-40B4-BE49-F238E27FC236}">
+                <a16:creationId xmlns:a16="http://schemas.microsoft.com/office/drawing/2014/main" id="{B009DD9D-719A-466A-82F7-ECBFEAC980B5}"/>
+              </a:ext>
+            </a:extLst>
+          </p:cNvPr>
+          <p:cNvSpPr txBox="1"/>
+          <p:nvPr/>
+        </p:nvSpPr>
+        <p:spPr>
+          <a:xfrm>
+            <a:off x="8296031" y="1913200"/>
+            <a:ext cx="1894115" cy="3638939"/>
+          </a:xfrm>
+          <a:prstGeom prst="rect">
+            <a:avLst/>
+          </a:prstGeom>
+          <a:solidFill>
+            <a:schemeClr val="tx1">
+              <a:lumMod val="85000"/>
+              <a:alpha val="30000"/>
+            </a:schemeClr>
+          </a:solidFill>
+        </p:spPr>
+        <p:txBody>
+          <a:bodyPr wrap="square" rtlCol="0">
+            <a:spAutoFit/>
+          </a:bodyPr>
+          <a:lstStyle/>
+          <a:p>
+            <a:endParaRPr lang="pt-PT" dirty="0"/>
+          </a:p>
+        </p:txBody>
+      </p:sp>
+      <p:pic>
+        <p:nvPicPr>
+          <p:cNvPr id="4" name="Picture 3" descr="A screenshot of a cell phone&#10;&#10;Description automatically generated with medium confidence">
+            <a:extLst>
+              <a:ext uri="{FF2B5EF4-FFF2-40B4-BE49-F238E27FC236}">
+                <a16:creationId xmlns:a16="http://schemas.microsoft.com/office/drawing/2014/main" id="{2655CE9D-75FE-4179-B1A9-7F6B47D7C08C}"/>
+              </a:ext>
+            </a:extLst>
+          </p:cNvPr>
+          <p:cNvPicPr>
+            <a:picLocks noChangeAspect="1"/>
+          </p:cNvPicPr>
+          <p:nvPr/>
+        </p:nvPicPr>
+        <p:blipFill>
+          <a:blip r:embed="rId2">
+            <a:extLst>
+              <a:ext uri="{28A0092B-C50C-407E-A947-70E740481C1C}">
+                <a14:useLocalDpi xmlns:a14="http://schemas.microsoft.com/office/drawing/2010/main" val="0"/>
+              </a:ext>
+            </a:extLst>
+          </a:blip>
+          <a:stretch>
+            <a:fillRect/>
+          </a:stretch>
+        </p:blipFill>
+        <p:spPr>
+          <a:xfrm>
+            <a:off x="7219699" y="1768876"/>
+            <a:ext cx="4842312" cy="3927589"/>
+          </a:xfrm>
+          <a:prstGeom prst="rect">
+            <a:avLst/>
+          </a:prstGeom>
+        </p:spPr>
+      </p:pic>
+      <p:sp>
+        <p:nvSpPr>
           <p:cNvPr id="2" name="Título 1"/>
           <p:cNvSpPr>
             <a:spLocks noGrp="1"/>
@@ -13121,42 +13147,12 @@
           <a:p>
             <a:pPr algn="ctr"/>
             <a:r>
-              <a:rPr lang="pt-PT" dirty="0" smtClean="0"/>
+              <a:rPr lang="pt-PT" dirty="0"/>
               <a:t>Arquitetura e Aspetos Técnicos</a:t>
             </a:r>
-            <a:endParaRPr lang="pt-PT" dirty="0"/>
           </a:p>
         </p:txBody>
       </p:sp>
-      <p:pic>
-        <p:nvPicPr>
-          <p:cNvPr id="21" name="Marcador de Posição de Conteúdo 20"/>
-          <p:cNvPicPr>
-            <a:picLocks noGrp="1" noChangeAspect="1"/>
-          </p:cNvPicPr>
-          <p:nvPr>
-            <p:ph idx="1"/>
-          </p:nvPr>
-        </p:nvPicPr>
-        <p:blipFill>
-          <a:blip r:embed="rId2">
-            <a:extLst>
-              <a:ext uri="{28A0092B-C50C-407E-A947-70E740481C1C}">
-                <a14:useLocalDpi xmlns:a14="http://schemas.microsoft.com/office/drawing/2010/main" val="0"/>
-              </a:ext>
-            </a:extLst>
-          </a:blip>
-          <a:stretch>
-            <a:fillRect/>
-          </a:stretch>
-        </p:blipFill>
-        <p:spPr>
-          <a:xfrm>
-            <a:off x="6817283" y="1478570"/>
-            <a:ext cx="5189537" cy="4203096"/>
-          </a:xfrm>
-        </p:spPr>
-      </p:pic>
       <p:sp>
         <p:nvSpPr>
           <p:cNvPr id="24" name="Marcador de Posição de Conteúdo 2"/>
@@ -13552,104 +13548,123 @@
           </a:lstStyle>
           <a:p>
             <a:r>
-              <a:rPr lang="pt-PT" sz="2000" dirty="0" smtClean="0"/>
+              <a:rPr lang="pt-PT" sz="2000" dirty="0"/>
               <a:t>Existem 2 atividades:</a:t>
             </a:r>
           </a:p>
           <a:p>
             <a:pPr lvl="1"/>
             <a:r>
-              <a:rPr lang="pt-PT" sz="1600" dirty="0" smtClean="0"/>
+              <a:rPr lang="pt-PT" sz="1600" dirty="0"/>
               <a:t>Login </a:t>
             </a:r>
           </a:p>
           <a:p>
             <a:pPr lvl="1"/>
             <a:r>
-              <a:rPr lang="pt-PT" sz="1600" dirty="0" smtClean="0"/>
+              <a:rPr lang="pt-PT" sz="1600" dirty="0"/>
               <a:t>Detentora da lógica da aplicação de fragmentos.</a:t>
             </a:r>
           </a:p>
           <a:p>
             <a:r>
-              <a:rPr lang="pt-PT" sz="2000" dirty="0" smtClean="0"/>
+              <a:rPr lang="pt-PT" sz="2000" dirty="0"/>
               <a:t>Cada fragmento tem acesso ao </a:t>
             </a:r>
             <a:r>
-              <a:rPr lang="pt-PT" sz="2000" i="1" dirty="0" err="1" smtClean="0"/>
-              <a:t>model</a:t>
-            </a:r>
-            <a:r>
-              <a:rPr lang="pt-PT" sz="2000" dirty="0" smtClean="0"/>
-              <a:t> e se preciso poderá também gerar um </a:t>
-            </a:r>
-            <a:r>
-              <a:rPr lang="pt-PT" sz="2000" i="1" dirty="0" smtClean="0"/>
+              <a:rPr lang="pt-PT" sz="2000" i="1" dirty="0" err="1"/>
+              <a:t>viewmodel</a:t>
+            </a:r>
+            <a:r>
+              <a:rPr lang="pt-PT" sz="2000" dirty="0"/>
+              <a:t> e se preciso poderá também gerar uma instância de </a:t>
+            </a:r>
+            <a:r>
+              <a:rPr lang="pt-PT" sz="2000" i="1" dirty="0"/>
               <a:t>job</a:t>
             </a:r>
             <a:r>
-              <a:rPr lang="pt-PT" sz="2000" dirty="0" smtClean="0"/>
+              <a:rPr lang="pt-PT" sz="2000" dirty="0"/>
               <a:t> </a:t>
             </a:r>
             <a:r>
-              <a:rPr lang="pt-PT" sz="2000" i="1" dirty="0" err="1" smtClean="0"/>
+              <a:rPr lang="pt-PT" sz="2000" i="1" dirty="0" err="1"/>
               <a:t>scheduler</a:t>
             </a:r>
             <a:r>
-              <a:rPr lang="pt-PT" sz="2000" dirty="0" smtClean="0"/>
+              <a:rPr lang="pt-PT" sz="2000" dirty="0"/>
               <a:t>.</a:t>
             </a:r>
           </a:p>
           <a:p>
             <a:r>
-              <a:rPr lang="pt-PT" sz="2000" dirty="0" smtClean="0"/>
-              <a:t>Toda a informação presente na aplicação é fornecida pelo </a:t>
-            </a:r>
-            <a:r>
-              <a:rPr lang="pt-PT" sz="2000" i="1" dirty="0" err="1" smtClean="0"/>
-              <a:t>model</a:t>
-            </a:r>
-            <a:r>
-              <a:rPr lang="pt-PT" sz="2000" i="1" dirty="0" smtClean="0"/>
-              <a:t>,</a:t>
-            </a:r>
-            <a:r>
-              <a:rPr lang="pt-PT" sz="2000" dirty="0" smtClean="0"/>
-              <a:t> observando sobre este a informação que é retornada pela base de dados.</a:t>
-            </a:r>
-          </a:p>
-          <a:p>
-            <a:r>
-              <a:rPr lang="pt-PT" sz="2000" dirty="0" smtClean="0"/>
-              <a:t>Apenas existe um </a:t>
-            </a:r>
-            <a:r>
-              <a:rPr lang="pt-PT" sz="2000" i="1" dirty="0" smtClean="0"/>
+              <a:rPr lang="pt-PT" sz="2000" dirty="0"/>
+              <a:t>O </a:t>
+            </a:r>
+            <a:r>
+              <a:rPr lang="pt-PT" sz="2000" i="1" dirty="0" err="1"/>
+              <a:t>viewmodel</a:t>
+            </a:r>
+            <a:r>
+              <a:rPr lang="pt-PT" sz="2000" dirty="0"/>
+              <a:t> é a ponte de comunicação entre o fragmento e a base de dados. Pela observação do retorno de algumas das suas funções, é possível obter os valores dos dados</a:t>
+            </a:r>
+          </a:p>
+          <a:p>
+            <a:r>
+              <a:rPr lang="pt-PT" sz="2000" dirty="0"/>
+              <a:t>Existe apenas um </a:t>
+            </a:r>
+            <a:r>
+              <a:rPr lang="pt-PT" sz="2000" i="1" dirty="0"/>
               <a:t>job</a:t>
             </a:r>
             <a:r>
-              <a:rPr lang="pt-PT" sz="2000" dirty="0" smtClean="0"/>
+              <a:rPr lang="pt-PT" sz="2000" dirty="0"/>
               <a:t> </a:t>
             </a:r>
             <a:r>
-              <a:rPr lang="pt-PT" sz="2000" i="1" dirty="0" err="1" smtClean="0"/>
+              <a:rPr lang="pt-PT" sz="2000" i="1" dirty="0" err="1"/>
               <a:t>scheduler</a:t>
             </a:r>
             <a:r>
-              <a:rPr lang="pt-PT" sz="2000" dirty="0" smtClean="0"/>
-              <a:t>, que contem diversos trabalhos. Este é responsável por executa-los.</a:t>
-            </a:r>
-          </a:p>
-          <a:p>
-            <a:r>
-              <a:rPr lang="pt-PT" sz="2000" i="1" dirty="0" err="1" smtClean="0"/>
+              <a:rPr lang="pt-PT" sz="2000" dirty="0"/>
+              <a:t>, que contém diversos trabalhos. Este é responsável por executar cada um.</a:t>
+            </a:r>
+          </a:p>
+          <a:p>
+            <a:r>
+              <a:rPr lang="pt-PT" sz="2000" i="1" dirty="0"/>
+              <a:t>A </a:t>
+            </a:r>
+            <a:r>
+              <a:rPr lang="pt-PT" sz="2000" i="1" dirty="0" err="1"/>
+              <a:t>layer</a:t>
+            </a:r>
+            <a:r>
+              <a:rPr lang="pt-PT" sz="2000" i="1" dirty="0"/>
+              <a:t> de</a:t>
+            </a:r>
+            <a:r>
+              <a:rPr lang="pt-PT" sz="2000" dirty="0"/>
+              <a:t> </a:t>
+            </a:r>
+            <a:r>
+              <a:rPr lang="pt-PT" sz="2000" i="1" dirty="0" err="1"/>
               <a:t>Services</a:t>
             </a:r>
             <a:r>
-              <a:rPr lang="pt-PT" sz="2000" dirty="0" smtClean="0"/>
-              <a:t> comunica com API já existente para reportar os resultados dos testes.</a:t>
-            </a:r>
-            <a:endParaRPr lang="pt-PT" sz="2000" dirty="0"/>
+              <a:rPr lang="pt-PT" sz="2000" dirty="0"/>
+              <a:t> tem como função comunicar com a </a:t>
+            </a:r>
+            <a:r>
+              <a:rPr lang="pt-PT" sz="2000" i="1" dirty="0"/>
+              <a:t>API</a:t>
+            </a:r>
+            <a:r>
+              <a:rPr lang="pt-PT" sz="2000" dirty="0"/>
+              <a:t> já existente para reportar os resultados dos testes.</a:t>
+            </a:r>
           </a:p>
         </p:txBody>
       </p:sp>
@@ -13663,13 +13678,6 @@
   <p:clrMapOvr>
     <a:masterClrMapping/>
   </p:clrMapOvr>
-  <p:timing>
-    <p:tnLst>
-      <p:par>
-        <p:cTn id="1" dur="indefinite" restart="never" nodeType="tmRoot"/>
-      </p:par>
-    </p:tnLst>
-  </p:timing>
 </p:sld>
 </file>
 
@@ -13712,10 +13720,9 @@
           <a:p>
             <a:pPr algn="ctr"/>
             <a:r>
-              <a:rPr lang="pt-PT" dirty="0" smtClean="0"/>
+              <a:rPr lang="pt-PT" dirty="0"/>
               <a:t>O que está Feito</a:t>
             </a:r>
-            <a:endParaRPr lang="pt-PT" dirty="0"/>
           </a:p>
         </p:txBody>
       </p:sp>
@@ -13740,31 +13747,31 @@
           <a:lstStyle/>
           <a:p>
             <a:r>
-              <a:rPr lang="pt-PT" dirty="0" smtClean="0"/>
+              <a:rPr lang="pt-PT" dirty="0"/>
               <a:t>Recolha de parâmetros Rádio;</a:t>
             </a:r>
           </a:p>
           <a:p>
             <a:r>
-              <a:rPr lang="pt-PT" dirty="0" smtClean="0"/>
+              <a:rPr lang="pt-PT" dirty="0"/>
               <a:t>Recolha de cobertura de internet;</a:t>
             </a:r>
           </a:p>
           <a:p>
             <a:r>
-              <a:rPr lang="pt-PT" dirty="0" smtClean="0"/>
+              <a:rPr lang="pt-PT" dirty="0"/>
               <a:t>Recolha da localização do dispositivo;</a:t>
             </a:r>
           </a:p>
           <a:p>
             <a:r>
-              <a:rPr lang="pt-PT" dirty="0" smtClean="0"/>
+              <a:rPr lang="pt-PT" dirty="0"/>
               <a:t>Modelo de acesso à base de dados;</a:t>
             </a:r>
           </a:p>
           <a:p>
             <a:r>
-              <a:rPr lang="pt-PT" dirty="0" smtClean="0"/>
+              <a:rPr lang="pt-PT" dirty="0"/>
               <a:t>Interface de utilizador (beta);</a:t>
             </a:r>
           </a:p>
@@ -13773,18 +13780,17 @@
               <a:buNone/>
             </a:pPr>
             <a:r>
-              <a:rPr lang="pt-PT" dirty="0" smtClean="0"/>
+              <a:rPr lang="pt-PT" dirty="0"/>
               <a:t> (colocar vídeo da </a:t>
             </a:r>
             <a:r>
-              <a:rPr lang="pt-PT" dirty="0" err="1" smtClean="0"/>
+              <a:rPr lang="pt-PT" dirty="0" err="1"/>
               <a:t>app</a:t>
             </a:r>
             <a:r>
-              <a:rPr lang="pt-PT" dirty="0" smtClean="0"/>
+              <a:rPr lang="pt-PT" dirty="0"/>
               <a:t>)</a:t>
             </a:r>
-            <a:endParaRPr lang="pt-PT" dirty="0"/>
           </a:p>
         </p:txBody>
       </p:sp>
@@ -13798,13 +13804,6 @@
   <p:clrMapOvr>
     <a:masterClrMapping/>
   </p:clrMapOvr>
-  <p:timing>
-    <p:tnLst>
-      <p:par>
-        <p:cTn id="1" dur="indefinite" restart="never" nodeType="tmRoot"/>
-      </p:par>
-    </p:tnLst>
-  </p:timing>
 </p:sld>
 </file>
 
@@ -13847,10 +13846,9 @@
           <a:p>
             <a:pPr algn="ctr"/>
             <a:r>
-              <a:rPr lang="pt-PT" dirty="0" smtClean="0"/>
+              <a:rPr lang="pt-PT" dirty="0"/>
               <a:t>O que falta fazer</a:t>
             </a:r>
-            <a:endParaRPr lang="pt-PT" dirty="0"/>
           </a:p>
         </p:txBody>
       </p:sp>
@@ -13875,42 +13873,42 @@
           <a:lstStyle/>
           <a:p>
             <a:r>
-              <a:rPr lang="pt-PT" dirty="0" smtClean="0"/>
+              <a:rPr lang="pt-PT" dirty="0"/>
               <a:t>Comunicação com </a:t>
             </a:r>
             <a:r>
-              <a:rPr lang="pt-PT" i="1" dirty="0" smtClean="0"/>
+              <a:rPr lang="pt-PT" i="1" dirty="0"/>
               <a:t>API</a:t>
             </a:r>
             <a:r>
-              <a:rPr lang="pt-PT" dirty="0" smtClean="0"/>
-              <a:t> (apenas está feito o Login)</a:t>
-            </a:r>
-          </a:p>
-          <a:p>
-            <a:r>
-              <a:rPr lang="pt-PT" dirty="0" smtClean="0"/>
-              <a:t>Arquitetar a melhor forma de realizar testes sem intervenção do utilizador e reporta-los à </a:t>
-            </a:r>
-            <a:r>
-              <a:rPr lang="pt-PT" i="1" dirty="0" smtClean="0"/>
+              <a:rPr lang="pt-PT" dirty="0"/>
+              <a:t> (está feito apenas o Login)</a:t>
+            </a:r>
+          </a:p>
+          <a:p>
+            <a:r>
+              <a:rPr lang="pt-PT" dirty="0"/>
+              <a:t>Arquitetar a melhor forma de realizar testes sem intervenção do utilizador e reportá-los à </a:t>
+            </a:r>
+            <a:r>
+              <a:rPr lang="pt-PT" i="1" dirty="0"/>
               <a:t>API</a:t>
             </a:r>
             <a:r>
-              <a:rPr lang="pt-PT" dirty="0" smtClean="0"/>
+              <a:rPr lang="pt-PT" dirty="0"/>
               <a:t>.</a:t>
             </a:r>
           </a:p>
           <a:p>
             <a:r>
-              <a:rPr lang="pt-PT" dirty="0" smtClean="0"/>
+              <a:rPr lang="pt-PT" dirty="0"/>
               <a:t>Implementar requisitos funcionais extra:</a:t>
             </a:r>
           </a:p>
           <a:p>
             <a:pPr lvl="1"/>
             <a:r>
-              <a:rPr lang="pt-PT" i="1" dirty="0" err="1" smtClean="0"/>
+              <a:rPr lang="pt-PT" i="1" dirty="0" err="1"/>
               <a:t>Ping</a:t>
             </a:r>
             <a:endParaRPr lang="pt-PT" i="1" dirty="0"/>
@@ -13918,23 +13916,19 @@
           <a:p>
             <a:pPr lvl="1"/>
             <a:r>
-              <a:rPr lang="pt-PT" dirty="0" smtClean="0"/>
+              <a:rPr lang="pt-PT" dirty="0"/>
               <a:t>Troca de ficheiros via </a:t>
             </a:r>
             <a:r>
-              <a:rPr lang="pt-PT" i="1" dirty="0" smtClean="0"/>
+              <a:rPr lang="pt-PT" i="1" dirty="0"/>
               <a:t>FTP</a:t>
             </a:r>
           </a:p>
           <a:p>
             <a:pPr lvl="1"/>
             <a:r>
-              <a:rPr lang="pt-PT" dirty="0" smtClean="0"/>
-              <a:t>Calcular velocidade </a:t>
-            </a:r>
-            <a:r>
               <a:rPr lang="pt-PT" dirty="0"/>
-              <a:t>de </a:t>
+              <a:t>Calcular velocidade de </a:t>
             </a:r>
             <a:r>
               <a:rPr lang="pt-PT" i="1" dirty="0"/>
@@ -13955,11 +13949,11 @@
           </a:p>
           <a:p>
             <a:pPr lvl="1"/>
-            <a:endParaRPr lang="pt-PT" dirty="0" smtClean="0"/>
+            <a:endParaRPr lang="pt-PT" dirty="0"/>
           </a:p>
           <a:p>
             <a:pPr lvl="1"/>
-            <a:endParaRPr lang="pt-PT" dirty="0" smtClean="0"/>
+            <a:endParaRPr lang="pt-PT" dirty="0"/>
           </a:p>
           <a:p>
             <a:endParaRPr lang="pt-PT" dirty="0"/>
@@ -13976,13 +13970,6 @@
   <p:clrMapOvr>
     <a:masterClrMapping/>
   </p:clrMapOvr>
-  <p:timing>
-    <p:tnLst>
-      <p:par>
-        <p:cTn id="1" dur="indefinite" restart="never" nodeType="tmRoot"/>
-      </p:par>
-    </p:tnLst>
-  </p:timing>
 </p:sld>
 </file>
 
@@ -14025,10 +14012,9 @@
           <a:p>
             <a:pPr algn="ctr"/>
             <a:r>
-              <a:rPr lang="pt-PT" dirty="0" smtClean="0"/>
+              <a:rPr lang="pt-PT" dirty="0"/>
               <a:t>Dificuldades </a:t>
             </a:r>
-            <a:endParaRPr lang="pt-PT" dirty="0"/>
           </a:p>
         </p:txBody>
       </p:sp>
@@ -14054,63 +14040,36 @@
           <a:p>
             <a:r>
               <a:rPr lang="pt-PT" dirty="0"/>
-              <a:t>Dificuldade de integração de um dispositivo mobile no sistema de gestão</a:t>
-            </a:r>
-            <a:r>
-              <a:rPr lang="pt-PT" dirty="0" smtClean="0"/>
-              <a:t>.</a:t>
-            </a:r>
-            <a:endParaRPr lang="pt-PT" dirty="0" smtClean="0"/>
-          </a:p>
-          <a:p>
-            <a:r>
-              <a:rPr lang="pt-PT" dirty="0" smtClean="0"/>
-              <a:t>Devido </a:t>
-            </a:r>
-            <a:r>
-              <a:rPr lang="pt-PT" dirty="0" smtClean="0"/>
-              <a:t>ao tempo dos testes ser indeterminado levantou dois problemas:</a:t>
+              <a:t>Dificuldade de integração de um dispositivo </a:t>
+            </a:r>
+            <a:r>
+              <a:rPr lang="pt-PT" i="1" dirty="0"/>
+              <a:t>mobile</a:t>
+            </a:r>
+            <a:r>
+              <a:rPr lang="pt-PT" dirty="0"/>
+              <a:t> no sistema de gestão.</a:t>
+            </a:r>
+          </a:p>
+          <a:p>
+            <a:r>
+              <a:rPr lang="pt-PT" dirty="0"/>
+              <a:t>Devido ao tempo dos testes ser indeterminado levantaram-se dois problemas:</a:t>
             </a:r>
           </a:p>
           <a:p>
             <a:pPr lvl="1"/>
             <a:r>
-              <a:rPr lang="pt-PT" dirty="0" smtClean="0"/>
-              <a:t>Qual a melhor arquitetura para realizar testes mesmo quando a </a:t>
-            </a:r>
-            <a:r>
-              <a:rPr lang="pt-PT" dirty="0" smtClean="0"/>
-              <a:t>aplicação se encontra em background</a:t>
-            </a:r>
-            <a:r>
-              <a:rPr lang="pt-PT" dirty="0" smtClean="0"/>
-              <a:t>;</a:t>
-            </a:r>
-            <a:endParaRPr lang="pt-PT" dirty="0" smtClean="0"/>
+              <a:rPr lang="pt-PT" dirty="0"/>
+              <a:t>Qual a melhor arquitetura para realizar testes mesmo quando a aplicação se encontra em background;</a:t>
+            </a:r>
           </a:p>
           <a:p>
             <a:pPr lvl="1"/>
             <a:r>
-              <a:rPr lang="pt-PT" dirty="0" smtClean="0"/>
-              <a:t>Comunicação </a:t>
-            </a:r>
-            <a:r>
-              <a:rPr lang="pt-PT" dirty="0" smtClean="0"/>
-              <a:t>entre o responsável pelos testes e a interface </a:t>
-            </a:r>
-            <a:r>
-              <a:rPr lang="pt-PT" dirty="0" smtClean="0"/>
-              <a:t>do </a:t>
-            </a:r>
-            <a:r>
-              <a:rPr lang="pt-PT" dirty="0" smtClean="0"/>
-              <a:t>utilizador</a:t>
-            </a:r>
-            <a:r>
-              <a:rPr lang="pt-PT" dirty="0" smtClean="0"/>
-              <a:t>.</a:t>
-            </a:r>
-            <a:endParaRPr lang="pt-PT" dirty="0" smtClean="0"/>
+              <a:rPr lang="pt-PT" dirty="0"/>
+              <a:t>Comunicação entre o responsável pelos testes e a interface do utilizador.</a:t>
+            </a:r>
           </a:p>
           <a:p>
             <a:pPr lvl="1"/>
@@ -14128,13 +14087,6 @@
   <p:clrMapOvr>
     <a:masterClrMapping/>
   </p:clrMapOvr>
-  <p:timing>
-    <p:tnLst>
-      <p:par>
-        <p:cTn id="1" dur="indefinite" restart="never" nodeType="tmRoot"/>
-      </p:par>
-    </p:tnLst>
-  </p:timing>
 </p:sld>
 </file>
 
@@ -14177,10 +14129,9 @@
           <a:p>
             <a:pPr algn="ctr"/>
             <a:r>
-              <a:rPr lang="pt-PT" dirty="0" smtClean="0"/>
+              <a:rPr lang="pt-PT" dirty="0"/>
               <a:t>Tecnologias Usadas</a:t>
             </a:r>
-            <a:endParaRPr lang="pt-PT" dirty="0"/>
           </a:p>
         </p:txBody>
       </p:sp>
@@ -14291,10 +14242,9 @@
           <a:lstStyle/>
           <a:p>
             <a:r>
-              <a:rPr lang="pt-PT" dirty="0" smtClean="0"/>
+              <a:rPr lang="pt-PT" dirty="0"/>
               <a:t>Material Ui</a:t>
             </a:r>
-            <a:endParaRPr lang="pt-PT" dirty="0"/>
           </a:p>
         </p:txBody>
       </p:sp>
@@ -14470,13 +14420,6 @@
   <p:clrMapOvr>
     <a:masterClrMapping/>
   </p:clrMapOvr>
-  <p:timing>
-    <p:tnLst>
-      <p:par>
-        <p:cTn id="1" dur="indefinite" restart="never" nodeType="tmRoot"/>
-      </p:par>
-    </p:tnLst>
-  </p:timing>
 </p:sld>
 </file>
 

</xml_diff>